<commit_message>
CSE 281 and CSE 6305
</commit_message>
<xml_diff>
--- a/files/CSE6305/CSE6305-L4.pptx
+++ b/files/CSE6305/CSE6305-L4.pptx
@@ -233,7 +233,7 @@
             <a:fld id="{E88EDA46-92D5-154A-9545-36B15D37F649}" type="datetimeFigureOut">
               <a:rPr lang="en-US" smtClean="0"/>
               <a:pPr/>
-              <a:t>7/9/19</a:t>
+              <a:t>7/23/19</a:t>
             </a:fld>
             <a:endParaRPr lang="en-US"/>
           </a:p>
@@ -401,7 +401,7 @@
             <a:fld id="{4547C672-21B7-4B4A-88FA-09C43C642ACF}" type="datetimeFigureOut">
               <a:rPr lang="en-US" smtClean="0"/>
               <a:pPr/>
-              <a:t>7/9/19</a:t>
+              <a:t>7/23/19</a:t>
             </a:fld>
             <a:endParaRPr lang="en-US"/>
           </a:p>
@@ -4650,13 +4650,6 @@
           </a:bodyPr>
           <a:lstStyle/>
           <a:p>
-            <a:r>
-              <a:rPr lang="en-US" sz="4000" dirty="0">
-                <a:latin typeface="Calibri"/>
-                <a:cs typeface="Calibri"/>
-              </a:rPr>
-              <a:t/>
-            </a:r>
             <a:br>
               <a:rPr lang="en-US" sz="4000" dirty="0">
                 <a:latin typeface="Calibri"/>
@@ -5278,13 +5271,6 @@
                 <a:cs typeface="Calibri"/>
               </a:rPr>
               <a:t> 1976, Bacon et al. 2001]</a:t>
-            </a:r>
-            <a:r>
-              <a:rPr lang="en-US" sz="1800" dirty="0">
-                <a:latin typeface="Calibri"/>
-                <a:cs typeface="Calibri"/>
-              </a:rPr>
-              <a:t/>
             </a:r>
             <a:br>
               <a:rPr lang="en-US" sz="1800" dirty="0">
@@ -14166,12 +14152,12 @@
             <a:effectLst/>
             <a:extLst>
               <a:ext uri="{909E8E84-426E-40dd-AFC4-6F175D3DCCD1}">
-                <a14:hiddenFill xmlns="" xmlns:a14="http://schemas.microsoft.com/office/drawing/2010/main">
+                <a14:hiddenFill xmlns:a14="http://schemas.microsoft.com/office/drawing/2010/main" xmlns="">
                   <a:noFill/>
                 </a14:hiddenFill>
               </a:ext>
               <a:ext uri="{AF507438-7753-43e0-B8FC-AC1667EBCBE1}">
-                <a14:hiddenEffects xmlns="" xmlns:a14="http://schemas.microsoft.com/office/drawing/2010/main">
+                <a14:hiddenEffects xmlns:a14="http://schemas.microsoft.com/office/drawing/2010/main" xmlns="">
                   <a:effectLst>
                     <a:outerShdw blurRad="63500" dist="38099" dir="2700000" algn="ctr" rotWithShape="0">
                       <a:schemeClr val="bg2">
@@ -14224,12 +14210,12 @@
             <a:effectLst/>
             <a:extLst>
               <a:ext uri="{909E8E84-426E-40dd-AFC4-6F175D3DCCD1}">
-                <a14:hiddenFill xmlns="" xmlns:a14="http://schemas.microsoft.com/office/drawing/2010/main">
+                <a14:hiddenFill xmlns:a14="http://schemas.microsoft.com/office/drawing/2010/main" xmlns="">
                   <a:noFill/>
                 </a14:hiddenFill>
               </a:ext>
               <a:ext uri="{AF507438-7753-43e0-B8FC-AC1667EBCBE1}">
-                <a14:hiddenEffects xmlns="" xmlns:a14="http://schemas.microsoft.com/office/drawing/2010/main">
+                <a14:hiddenEffects xmlns:a14="http://schemas.microsoft.com/office/drawing/2010/main" xmlns="">
                   <a:effectLst>
                     <a:outerShdw blurRad="63500" dist="38099" dir="2700000" algn="ctr" rotWithShape="0">
                       <a:schemeClr val="bg2">
@@ -14282,12 +14268,12 @@
             <a:effectLst/>
             <a:extLst>
               <a:ext uri="{909E8E84-426E-40dd-AFC4-6F175D3DCCD1}">
-                <a14:hiddenFill xmlns="" xmlns:a14="http://schemas.microsoft.com/office/drawing/2010/main">
+                <a14:hiddenFill xmlns:a14="http://schemas.microsoft.com/office/drawing/2010/main" xmlns="">
                   <a:noFill/>
                 </a14:hiddenFill>
               </a:ext>
               <a:ext uri="{AF507438-7753-43e0-B8FC-AC1667EBCBE1}">
-                <a14:hiddenEffects xmlns="" xmlns:a14="http://schemas.microsoft.com/office/drawing/2010/main">
+                <a14:hiddenEffects xmlns:a14="http://schemas.microsoft.com/office/drawing/2010/main" xmlns="">
                   <a:effectLst>
                     <a:outerShdw blurRad="63500" dist="38099" dir="2700000" algn="ctr" rotWithShape="0">
                       <a:schemeClr val="bg2">
@@ -14375,7 +14361,7 @@
               <a:effectLst/>
               <a:extLst>
                 <a:ext uri="{AF507438-7753-43e0-B8FC-AC1667EBCBE1}">
-                  <a14:hiddenEffects xmlns="" xmlns:a14="http://schemas.microsoft.com/office/drawing/2010/main">
+                  <a14:hiddenEffects xmlns:a14="http://schemas.microsoft.com/office/drawing/2010/main" xmlns="">
                     <a:effectLst>
                       <a:outerShdw blurRad="63500" dist="38099" dir="2700000" algn="ctr" rotWithShape="0">
                         <a:schemeClr val="bg2">
@@ -14436,7 +14422,7 @@
               <a:effectLst/>
               <a:extLst>
                 <a:ext uri="{AF507438-7753-43e0-B8FC-AC1667EBCBE1}">
-                  <a14:hiddenEffects xmlns="" xmlns:a14="http://schemas.microsoft.com/office/drawing/2010/main">
+                  <a14:hiddenEffects xmlns:a14="http://schemas.microsoft.com/office/drawing/2010/main" xmlns="">
                     <a:effectLst>
                       <a:outerShdw blurRad="63500" dist="38099" dir="2700000" algn="ctr" rotWithShape="0">
                         <a:schemeClr val="bg2">
@@ -14497,7 +14483,7 @@
               <a:effectLst/>
               <a:extLst>
                 <a:ext uri="{AF507438-7753-43e0-B8FC-AC1667EBCBE1}">
-                  <a14:hiddenEffects xmlns="" xmlns:a14="http://schemas.microsoft.com/office/drawing/2010/main">
+                  <a14:hiddenEffects xmlns:a14="http://schemas.microsoft.com/office/drawing/2010/main" xmlns="">
                     <a:effectLst>
                       <a:outerShdw blurRad="63500" dist="38099" dir="2700000" algn="ctr" rotWithShape="0">
                         <a:schemeClr val="bg2">
@@ -14558,7 +14544,7 @@
               <a:effectLst/>
               <a:extLst>
                 <a:ext uri="{AF507438-7753-43e0-B8FC-AC1667EBCBE1}">
-                  <a14:hiddenEffects xmlns="" xmlns:a14="http://schemas.microsoft.com/office/drawing/2010/main">
+                  <a14:hiddenEffects xmlns:a14="http://schemas.microsoft.com/office/drawing/2010/main" xmlns="">
                     <a:effectLst>
                       <a:outerShdw blurRad="63500" dist="38099" dir="2700000" algn="ctr" rotWithShape="0">
                         <a:schemeClr val="bg2">
@@ -14619,7 +14605,7 @@
               <a:effectLst/>
               <a:extLst>
                 <a:ext uri="{AF507438-7753-43e0-B8FC-AC1667EBCBE1}">
-                  <a14:hiddenEffects xmlns="" xmlns:a14="http://schemas.microsoft.com/office/drawing/2010/main">
+                  <a14:hiddenEffects xmlns:a14="http://schemas.microsoft.com/office/drawing/2010/main" xmlns="">
                     <a:effectLst>
                       <a:outerShdw blurRad="63500" dist="38099" dir="2700000" algn="ctr" rotWithShape="0">
                         <a:schemeClr val="bg2">
@@ -14680,7 +14666,7 @@
               <a:effectLst/>
               <a:extLst>
                 <a:ext uri="{AF507438-7753-43e0-B8FC-AC1667EBCBE1}">
-                  <a14:hiddenEffects xmlns="" xmlns:a14="http://schemas.microsoft.com/office/drawing/2010/main">
+                  <a14:hiddenEffects xmlns:a14="http://schemas.microsoft.com/office/drawing/2010/main" xmlns="">
                     <a:effectLst>
                       <a:outerShdw blurRad="63500" dist="38099" dir="2700000" algn="ctr" rotWithShape="0">
                         <a:schemeClr val="bg2">
@@ -14741,7 +14727,7 @@
               <a:effectLst/>
               <a:extLst>
                 <a:ext uri="{AF507438-7753-43e0-B8FC-AC1667EBCBE1}">
-                  <a14:hiddenEffects xmlns="" xmlns:a14="http://schemas.microsoft.com/office/drawing/2010/main">
+                  <a14:hiddenEffects xmlns:a14="http://schemas.microsoft.com/office/drawing/2010/main" xmlns="">
                     <a:effectLst>
                       <a:outerShdw blurRad="63500" dist="38099" dir="2700000" algn="ctr" rotWithShape="0">
                         <a:schemeClr val="bg2">
@@ -14802,12 +14788,12 @@
               <a:effectLst/>
               <a:extLst>
                 <a:ext uri="{909E8E84-426E-40dd-AFC4-6F175D3DCCD1}">
-                  <a14:hiddenFill xmlns="" xmlns:a14="http://schemas.microsoft.com/office/drawing/2010/main">
+                  <a14:hiddenFill xmlns:a14="http://schemas.microsoft.com/office/drawing/2010/main" xmlns="">
                     <a:noFill/>
                   </a14:hiddenFill>
                 </a:ext>
                 <a:ext uri="{AF507438-7753-43e0-B8FC-AC1667EBCBE1}">
-                  <a14:hiddenEffects xmlns="" xmlns:a14="http://schemas.microsoft.com/office/drawing/2010/main">
+                  <a14:hiddenEffects xmlns:a14="http://schemas.microsoft.com/office/drawing/2010/main" xmlns="">
                     <a:effectLst>
                       <a:outerShdw blurRad="63500" dist="38099" dir="2700000" algn="ctr" rotWithShape="0">
                         <a:schemeClr val="bg2">
@@ -14850,12 +14836,12 @@
               <a:effectLst/>
               <a:extLst>
                 <a:ext uri="{909E8E84-426E-40dd-AFC4-6F175D3DCCD1}">
-                  <a14:hiddenFill xmlns="" xmlns:a14="http://schemas.microsoft.com/office/drawing/2010/main">
+                  <a14:hiddenFill xmlns:a14="http://schemas.microsoft.com/office/drawing/2010/main" xmlns="">
                     <a:noFill/>
                   </a14:hiddenFill>
                 </a:ext>
                 <a:ext uri="{AF507438-7753-43e0-B8FC-AC1667EBCBE1}">
-                  <a14:hiddenEffects xmlns="" xmlns:a14="http://schemas.microsoft.com/office/drawing/2010/main">
+                  <a14:hiddenEffects xmlns:a14="http://schemas.microsoft.com/office/drawing/2010/main" xmlns="">
                     <a:effectLst>
                       <a:outerShdw blurRad="63500" dist="38099" dir="2700000" algn="ctr" rotWithShape="0">
                         <a:schemeClr val="bg2">
@@ -14896,12 +14882,12 @@
               <a:effectLst/>
               <a:extLst>
                 <a:ext uri="{909E8E84-426E-40dd-AFC4-6F175D3DCCD1}">
-                  <a14:hiddenFill xmlns="" xmlns:a14="http://schemas.microsoft.com/office/drawing/2010/main">
+                  <a14:hiddenFill xmlns:a14="http://schemas.microsoft.com/office/drawing/2010/main" xmlns="">
                     <a:noFill/>
                   </a14:hiddenFill>
                 </a:ext>
                 <a:ext uri="{AF507438-7753-43e0-B8FC-AC1667EBCBE1}">
-                  <a14:hiddenEffects xmlns="" xmlns:a14="http://schemas.microsoft.com/office/drawing/2010/main">
+                  <a14:hiddenEffects xmlns:a14="http://schemas.microsoft.com/office/drawing/2010/main" xmlns="">
                     <a:effectLst>
                       <a:outerShdw blurRad="63500" dist="38099" dir="2700000" algn="ctr" rotWithShape="0">
                         <a:schemeClr val="bg2">
@@ -14944,12 +14930,12 @@
               <a:effectLst/>
               <a:extLst>
                 <a:ext uri="{909E8E84-426E-40dd-AFC4-6F175D3DCCD1}">
-                  <a14:hiddenFill xmlns="" xmlns:a14="http://schemas.microsoft.com/office/drawing/2010/main">
+                  <a14:hiddenFill xmlns:a14="http://schemas.microsoft.com/office/drawing/2010/main" xmlns="">
                     <a:noFill/>
                   </a14:hiddenFill>
                 </a:ext>
                 <a:ext uri="{AF507438-7753-43e0-B8FC-AC1667EBCBE1}">
-                  <a14:hiddenEffects xmlns="" xmlns:a14="http://schemas.microsoft.com/office/drawing/2010/main">
+                  <a14:hiddenEffects xmlns:a14="http://schemas.microsoft.com/office/drawing/2010/main" xmlns="">
                     <a:effectLst>
                       <a:outerShdw blurRad="63500" dist="38099" dir="2700000" algn="ctr" rotWithShape="0">
                         <a:schemeClr val="bg2">
@@ -14992,12 +14978,12 @@
               <a:effectLst/>
               <a:extLst>
                 <a:ext uri="{909E8E84-426E-40dd-AFC4-6F175D3DCCD1}">
-                  <a14:hiddenFill xmlns="" xmlns:a14="http://schemas.microsoft.com/office/drawing/2010/main">
+                  <a14:hiddenFill xmlns:a14="http://schemas.microsoft.com/office/drawing/2010/main" xmlns="">
                     <a:noFill/>
                   </a14:hiddenFill>
                 </a:ext>
                 <a:ext uri="{AF507438-7753-43e0-B8FC-AC1667EBCBE1}">
-                  <a14:hiddenEffects xmlns="" xmlns:a14="http://schemas.microsoft.com/office/drawing/2010/main">
+                  <a14:hiddenEffects xmlns:a14="http://schemas.microsoft.com/office/drawing/2010/main" xmlns="">
                     <a:effectLst>
                       <a:outerShdw blurRad="63500" dist="38099" dir="2700000" algn="ctr" rotWithShape="0">
                         <a:schemeClr val="bg2">
@@ -15040,12 +15026,12 @@
               <a:effectLst/>
               <a:extLst>
                 <a:ext uri="{909E8E84-426E-40dd-AFC4-6F175D3DCCD1}">
-                  <a14:hiddenFill xmlns="" xmlns:a14="http://schemas.microsoft.com/office/drawing/2010/main">
+                  <a14:hiddenFill xmlns:a14="http://schemas.microsoft.com/office/drawing/2010/main" xmlns="">
                     <a:noFill/>
                   </a14:hiddenFill>
                 </a:ext>
                 <a:ext uri="{AF507438-7753-43e0-B8FC-AC1667EBCBE1}">
-                  <a14:hiddenEffects xmlns="" xmlns:a14="http://schemas.microsoft.com/office/drawing/2010/main">
+                  <a14:hiddenEffects xmlns:a14="http://schemas.microsoft.com/office/drawing/2010/main" xmlns="">
                     <a:effectLst>
                       <a:outerShdw blurRad="63500" dist="38099" dir="2700000" algn="ctr" rotWithShape="0">
                         <a:schemeClr val="bg2">
@@ -15089,12 +15075,12 @@
             <a:effectLst/>
             <a:extLst>
               <a:ext uri="{909E8E84-426E-40dd-AFC4-6F175D3DCCD1}">
-                <a14:hiddenFill xmlns="" xmlns:a14="http://schemas.microsoft.com/office/drawing/2010/main">
+                <a14:hiddenFill xmlns:a14="http://schemas.microsoft.com/office/drawing/2010/main" xmlns="">
                   <a:noFill/>
                 </a14:hiddenFill>
               </a:ext>
               <a:ext uri="{AF507438-7753-43e0-B8FC-AC1667EBCBE1}">
-                <a14:hiddenEffects xmlns="" xmlns:a14="http://schemas.microsoft.com/office/drawing/2010/main">
+                <a14:hiddenEffects xmlns:a14="http://schemas.microsoft.com/office/drawing/2010/main" xmlns="">
                   <a:effectLst>
                     <a:outerShdw blurRad="63500" dist="38099" dir="2700000" algn="ctr" rotWithShape="0">
                       <a:schemeClr val="bg2">
@@ -15136,12 +15122,12 @@
           <a:effectLst/>
           <a:extLst>
             <a:ext uri="{909E8E84-426E-40dd-AFC4-6F175D3DCCD1}">
-              <a14:hiddenFill xmlns="" xmlns:a14="http://schemas.microsoft.com/office/drawing/2010/main">
+              <a14:hiddenFill xmlns:a14="http://schemas.microsoft.com/office/drawing/2010/main" xmlns="">
                 <a:noFill/>
               </a14:hiddenFill>
             </a:ext>
             <a:ext uri="{AF507438-7753-43e0-B8FC-AC1667EBCBE1}">
-              <a14:hiddenEffects xmlns="" xmlns:a14="http://schemas.microsoft.com/office/drawing/2010/main">
+              <a14:hiddenEffects xmlns:a14="http://schemas.microsoft.com/office/drawing/2010/main" xmlns="">
                 <a:effectLst>
                   <a:outerShdw blurRad="63500" dist="38099" dir="2700000" algn="ctr" rotWithShape="0">
                     <a:schemeClr val="bg2">
@@ -15182,12 +15168,12 @@
           <a:effectLst/>
           <a:extLst>
             <a:ext uri="{909E8E84-426E-40dd-AFC4-6F175D3DCCD1}">
-              <a14:hiddenFill xmlns="" xmlns:a14="http://schemas.microsoft.com/office/drawing/2010/main">
+              <a14:hiddenFill xmlns:a14="http://schemas.microsoft.com/office/drawing/2010/main" xmlns="">
                 <a:noFill/>
               </a14:hiddenFill>
             </a:ext>
             <a:ext uri="{AF507438-7753-43e0-B8FC-AC1667EBCBE1}">
-              <a14:hiddenEffects xmlns="" xmlns:a14="http://schemas.microsoft.com/office/drawing/2010/main">
+              <a14:hiddenEffects xmlns:a14="http://schemas.microsoft.com/office/drawing/2010/main" xmlns="">
                 <a:effectLst>
                   <a:outerShdw blurRad="63500" dist="38099" dir="2700000" algn="ctr" rotWithShape="0">
                     <a:schemeClr val="bg2">
@@ -16611,12 +16597,12 @@
             <a:effectLst/>
             <a:extLst>
               <a:ext uri="{909E8E84-426E-40dd-AFC4-6F175D3DCCD1}">
-                <a14:hiddenFill xmlns="" xmlns:a14="http://schemas.microsoft.com/office/drawing/2010/main">
+                <a14:hiddenFill xmlns:a14="http://schemas.microsoft.com/office/drawing/2010/main" xmlns="">
                   <a:noFill/>
                 </a14:hiddenFill>
               </a:ext>
               <a:ext uri="{AF507438-7753-43e0-B8FC-AC1667EBCBE1}">
-                <a14:hiddenEffects xmlns="" xmlns:a14="http://schemas.microsoft.com/office/drawing/2010/main">
+                <a14:hiddenEffects xmlns:a14="http://schemas.microsoft.com/office/drawing/2010/main" xmlns="">
                   <a:effectLst>
                     <a:outerShdw blurRad="63500" dist="38099" dir="2700000" algn="ctr" rotWithShape="0">
                       <a:schemeClr val="bg2">
@@ -16671,12 +16657,12 @@
             <a:effectLst/>
             <a:extLst>
               <a:ext uri="{909E8E84-426E-40dd-AFC4-6F175D3DCCD1}">
-                <a14:hiddenFill xmlns="" xmlns:a14="http://schemas.microsoft.com/office/drawing/2010/main">
+                <a14:hiddenFill xmlns:a14="http://schemas.microsoft.com/office/drawing/2010/main" xmlns="">
                   <a:noFill/>
                 </a14:hiddenFill>
               </a:ext>
               <a:ext uri="{AF507438-7753-43e0-B8FC-AC1667EBCBE1}">
-                <a14:hiddenEffects xmlns="" xmlns:a14="http://schemas.microsoft.com/office/drawing/2010/main">
+                <a14:hiddenEffects xmlns:a14="http://schemas.microsoft.com/office/drawing/2010/main" xmlns="">
                   <a:effectLst>
                     <a:outerShdw blurRad="63500" dist="38099" dir="2700000" algn="ctr" rotWithShape="0">
                       <a:schemeClr val="bg2">
@@ -16718,12 +16704,12 @@
             <a:effectLst/>
             <a:extLst>
               <a:ext uri="{909E8E84-426E-40dd-AFC4-6F175D3DCCD1}">
-                <a14:hiddenFill xmlns="" xmlns:a14="http://schemas.microsoft.com/office/drawing/2010/main">
+                <a14:hiddenFill xmlns:a14="http://schemas.microsoft.com/office/drawing/2010/main" xmlns="">
                   <a:noFill/>
                 </a14:hiddenFill>
               </a:ext>
               <a:ext uri="{AF507438-7753-43e0-B8FC-AC1667EBCBE1}">
-                <a14:hiddenEffects xmlns="" xmlns:a14="http://schemas.microsoft.com/office/drawing/2010/main">
+                <a14:hiddenEffects xmlns:a14="http://schemas.microsoft.com/office/drawing/2010/main" xmlns="">
                   <a:effectLst>
                     <a:outerShdw blurRad="63500" dist="38099" dir="2700000" algn="ctr" rotWithShape="0">
                       <a:schemeClr val="bg2">
@@ -16766,12 +16752,12 @@
             <a:effectLst/>
             <a:extLst>
               <a:ext uri="{909E8E84-426E-40dd-AFC4-6F175D3DCCD1}">
-                <a14:hiddenFill xmlns="" xmlns:a14="http://schemas.microsoft.com/office/drawing/2010/main">
+                <a14:hiddenFill xmlns:a14="http://schemas.microsoft.com/office/drawing/2010/main" xmlns="">
                   <a:noFill/>
                 </a14:hiddenFill>
               </a:ext>
               <a:ext uri="{AF507438-7753-43e0-B8FC-AC1667EBCBE1}">
-                <a14:hiddenEffects xmlns="" xmlns:a14="http://schemas.microsoft.com/office/drawing/2010/main">
+                <a14:hiddenEffects xmlns:a14="http://schemas.microsoft.com/office/drawing/2010/main" xmlns="">
                   <a:effectLst>
                     <a:outerShdw blurRad="63500" dist="38099" dir="2700000" algn="ctr" rotWithShape="0">
                       <a:schemeClr val="bg2">
@@ -16846,7 +16832,7 @@
                 <a:effectLst/>
                 <a:extLst>
                   <a:ext uri="{AF507438-7753-43e0-B8FC-AC1667EBCBE1}">
-                    <a14:hiddenEffects xmlns="" xmlns:a14="http://schemas.microsoft.com/office/drawing/2010/main">
+                    <a14:hiddenEffects xmlns:a14="http://schemas.microsoft.com/office/drawing/2010/main" xmlns="">
                       <a:effectLst>
                         <a:outerShdw blurRad="63500" dist="38099" dir="2700000" algn="ctr" rotWithShape="0">
                           <a:schemeClr val="bg2">
@@ -16905,14 +16891,14 @@
                 <a:effectLst/>
                 <a:extLst>
                   <a:ext uri="{909E8E84-426E-40dd-AFC4-6F175D3DCCD1}">
-                    <a14:hiddenFill xmlns="" xmlns:a14="http://schemas.microsoft.com/office/drawing/2010/main">
+                    <a14:hiddenFill xmlns:a14="http://schemas.microsoft.com/office/drawing/2010/main" xmlns="">
                       <a:solidFill>
                         <a:schemeClr val="accent1"/>
                       </a:solidFill>
                     </a14:hiddenFill>
                   </a:ext>
                   <a:ext uri="{91240B29-F687-4f45-9708-019B960494DF}">
-                    <a14:hiddenLine xmlns="" xmlns:a14="http://schemas.microsoft.com/office/drawing/2010/main" w="9525">
+                    <a14:hiddenLine xmlns:a14="http://schemas.microsoft.com/office/drawing/2010/main" xmlns="" w="9525">
                       <a:solidFill>
                         <a:schemeClr val="tx1"/>
                       </a:solidFill>
@@ -16922,7 +16908,7 @@
                     </a14:hiddenLine>
                   </a:ext>
                   <a:ext uri="{AF507438-7753-43e0-B8FC-AC1667EBCBE1}">
-                    <a14:hiddenEffects xmlns="" xmlns:a14="http://schemas.microsoft.com/office/drawing/2010/main">
+                    <a14:hiddenEffects xmlns:a14="http://schemas.microsoft.com/office/drawing/2010/main" xmlns="">
                       <a:effectLst>
                         <a:outerShdw blurRad="63500" dist="38099" dir="2700000" algn="ctr" rotWithShape="0">
                           <a:schemeClr val="bg2">
@@ -17002,7 +16988,7 @@
                 <a:effectLst/>
                 <a:extLst>
                   <a:ext uri="{AF507438-7753-43e0-B8FC-AC1667EBCBE1}">
-                    <a14:hiddenEffects xmlns="" xmlns:a14="http://schemas.microsoft.com/office/drawing/2010/main">
+                    <a14:hiddenEffects xmlns:a14="http://schemas.microsoft.com/office/drawing/2010/main" xmlns="">
                       <a:effectLst>
                         <a:outerShdw blurRad="63500" dist="38099" dir="2700000" algn="ctr" rotWithShape="0">
                           <a:schemeClr val="bg2">
@@ -17061,14 +17047,14 @@
                 <a:effectLst/>
                 <a:extLst>
                   <a:ext uri="{909E8E84-426E-40dd-AFC4-6F175D3DCCD1}">
-                    <a14:hiddenFill xmlns="" xmlns:a14="http://schemas.microsoft.com/office/drawing/2010/main">
+                    <a14:hiddenFill xmlns:a14="http://schemas.microsoft.com/office/drawing/2010/main" xmlns="">
                       <a:solidFill>
                         <a:schemeClr val="accent1"/>
                       </a:solidFill>
                     </a14:hiddenFill>
                   </a:ext>
                   <a:ext uri="{91240B29-F687-4f45-9708-019B960494DF}">
-                    <a14:hiddenLine xmlns="" xmlns:a14="http://schemas.microsoft.com/office/drawing/2010/main" w="9525">
+                    <a14:hiddenLine xmlns:a14="http://schemas.microsoft.com/office/drawing/2010/main" xmlns="" w="9525">
                       <a:solidFill>
                         <a:schemeClr val="tx1"/>
                       </a:solidFill>
@@ -17078,7 +17064,7 @@
                     </a14:hiddenLine>
                   </a:ext>
                   <a:ext uri="{AF507438-7753-43e0-B8FC-AC1667EBCBE1}">
-                    <a14:hiddenEffects xmlns="" xmlns:a14="http://schemas.microsoft.com/office/drawing/2010/main">
+                    <a14:hiddenEffects xmlns:a14="http://schemas.microsoft.com/office/drawing/2010/main" xmlns="">
                       <a:effectLst>
                         <a:outerShdw blurRad="63500" dist="38099" dir="2700000" algn="ctr" rotWithShape="0">
                           <a:schemeClr val="bg2">
@@ -17158,7 +17144,7 @@
                 <a:effectLst/>
                 <a:extLst>
                   <a:ext uri="{AF507438-7753-43e0-B8FC-AC1667EBCBE1}">
-                    <a14:hiddenEffects xmlns="" xmlns:a14="http://schemas.microsoft.com/office/drawing/2010/main">
+                    <a14:hiddenEffects xmlns:a14="http://schemas.microsoft.com/office/drawing/2010/main" xmlns="">
                       <a:effectLst>
                         <a:outerShdw blurRad="63500" dist="38099" dir="2700000" algn="ctr" rotWithShape="0">
                           <a:schemeClr val="bg2">
@@ -17217,14 +17203,14 @@
                 <a:effectLst/>
                 <a:extLst>
                   <a:ext uri="{909E8E84-426E-40dd-AFC4-6F175D3DCCD1}">
-                    <a14:hiddenFill xmlns="" xmlns:a14="http://schemas.microsoft.com/office/drawing/2010/main">
+                    <a14:hiddenFill xmlns:a14="http://schemas.microsoft.com/office/drawing/2010/main" xmlns="">
                       <a:solidFill>
                         <a:schemeClr val="accent1"/>
                       </a:solidFill>
                     </a14:hiddenFill>
                   </a:ext>
                   <a:ext uri="{91240B29-F687-4f45-9708-019B960494DF}">
-                    <a14:hiddenLine xmlns="" xmlns:a14="http://schemas.microsoft.com/office/drawing/2010/main" w="9525">
+                    <a14:hiddenLine xmlns:a14="http://schemas.microsoft.com/office/drawing/2010/main" xmlns="" w="9525">
                       <a:solidFill>
                         <a:schemeClr val="tx1"/>
                       </a:solidFill>
@@ -17234,7 +17220,7 @@
                     </a14:hiddenLine>
                   </a:ext>
                   <a:ext uri="{AF507438-7753-43e0-B8FC-AC1667EBCBE1}">
-                    <a14:hiddenEffects xmlns="" xmlns:a14="http://schemas.microsoft.com/office/drawing/2010/main">
+                    <a14:hiddenEffects xmlns:a14="http://schemas.microsoft.com/office/drawing/2010/main" xmlns="">
                       <a:effectLst>
                         <a:outerShdw blurRad="63500" dist="38099" dir="2700000" algn="ctr" rotWithShape="0">
                           <a:schemeClr val="bg2">
@@ -17307,14 +17293,14 @@
                 <a:effectLst/>
                 <a:extLst>
                   <a:ext uri="{909E8E84-426E-40dd-AFC4-6F175D3DCCD1}">
-                    <a14:hiddenFill xmlns="" xmlns:a14="http://schemas.microsoft.com/office/drawing/2010/main">
+                    <a14:hiddenFill xmlns:a14="http://schemas.microsoft.com/office/drawing/2010/main" xmlns="">
                       <a:solidFill>
                         <a:schemeClr val="accent1"/>
                       </a:solidFill>
                     </a14:hiddenFill>
                   </a:ext>
                   <a:ext uri="{91240B29-F687-4f45-9708-019B960494DF}">
-                    <a14:hiddenLine xmlns="" xmlns:a14="http://schemas.microsoft.com/office/drawing/2010/main" w="9525">
+                    <a14:hiddenLine xmlns:a14="http://schemas.microsoft.com/office/drawing/2010/main" xmlns="" w="9525">
                       <a:solidFill>
                         <a:schemeClr val="tx1"/>
                       </a:solidFill>
@@ -17324,7 +17310,7 @@
                     </a14:hiddenLine>
                   </a:ext>
                   <a:ext uri="{AF507438-7753-43e0-B8FC-AC1667EBCBE1}">
-                    <a14:hiddenEffects xmlns="" xmlns:a14="http://schemas.microsoft.com/office/drawing/2010/main">
+                    <a14:hiddenEffects xmlns:a14="http://schemas.microsoft.com/office/drawing/2010/main" xmlns="">
                       <a:effectLst>
                         <a:outerShdw blurRad="63500" dist="38099" dir="2700000" algn="ctr" rotWithShape="0">
                           <a:schemeClr val="bg2">
@@ -17387,7 +17373,7 @@
                 <a:effectLst/>
                 <a:extLst>
                   <a:ext uri="{AF507438-7753-43e0-B8FC-AC1667EBCBE1}">
-                    <a14:hiddenEffects xmlns="" xmlns:a14="http://schemas.microsoft.com/office/drawing/2010/main">
+                    <a14:hiddenEffects xmlns:a14="http://schemas.microsoft.com/office/drawing/2010/main" xmlns="">
                       <a:effectLst>
                         <a:outerShdw blurRad="63500" dist="38099" dir="2700000" algn="ctr" rotWithShape="0">
                           <a:schemeClr val="bg2">
@@ -17463,14 +17449,14 @@
                 <a:effectLst/>
                 <a:extLst>
                   <a:ext uri="{909E8E84-426E-40dd-AFC4-6F175D3DCCD1}">
-                    <a14:hiddenFill xmlns="" xmlns:a14="http://schemas.microsoft.com/office/drawing/2010/main">
+                    <a14:hiddenFill xmlns:a14="http://schemas.microsoft.com/office/drawing/2010/main" xmlns="">
                       <a:solidFill>
                         <a:schemeClr val="accent1"/>
                       </a:solidFill>
                     </a14:hiddenFill>
                   </a:ext>
                   <a:ext uri="{91240B29-F687-4f45-9708-019B960494DF}">
-                    <a14:hiddenLine xmlns="" xmlns:a14="http://schemas.microsoft.com/office/drawing/2010/main" w="9525">
+                    <a14:hiddenLine xmlns:a14="http://schemas.microsoft.com/office/drawing/2010/main" xmlns="" w="9525">
                       <a:solidFill>
                         <a:schemeClr val="tx1"/>
                       </a:solidFill>
@@ -17480,7 +17466,7 @@
                     </a14:hiddenLine>
                   </a:ext>
                   <a:ext uri="{AF507438-7753-43e0-B8FC-AC1667EBCBE1}">
-                    <a14:hiddenEffects xmlns="" xmlns:a14="http://schemas.microsoft.com/office/drawing/2010/main">
+                    <a14:hiddenEffects xmlns:a14="http://schemas.microsoft.com/office/drawing/2010/main" xmlns="">
                       <a:effectLst>
                         <a:outerShdw blurRad="63500" dist="38099" dir="2700000" algn="ctr" rotWithShape="0">
                           <a:schemeClr val="bg2">
@@ -17543,7 +17529,7 @@
                 <a:effectLst/>
                 <a:extLst>
                   <a:ext uri="{AF507438-7753-43e0-B8FC-AC1667EBCBE1}">
-                    <a14:hiddenEffects xmlns="" xmlns:a14="http://schemas.microsoft.com/office/drawing/2010/main">
+                    <a14:hiddenEffects xmlns:a14="http://schemas.microsoft.com/office/drawing/2010/main" xmlns="">
                       <a:effectLst>
                         <a:outerShdw blurRad="63500" dist="38099" dir="2700000" algn="ctr" rotWithShape="0">
                           <a:schemeClr val="bg2">
@@ -17613,12 +17599,12 @@
             <a:effectLst/>
             <a:extLst>
               <a:ext uri="{909E8E84-426E-40dd-AFC4-6F175D3DCCD1}">
-                <a14:hiddenFill xmlns="" xmlns:a14="http://schemas.microsoft.com/office/drawing/2010/main">
+                <a14:hiddenFill xmlns:a14="http://schemas.microsoft.com/office/drawing/2010/main" xmlns="">
                   <a:noFill/>
                 </a14:hiddenFill>
               </a:ext>
               <a:ext uri="{AF507438-7753-43e0-B8FC-AC1667EBCBE1}">
-                <a14:hiddenEffects xmlns="" xmlns:a14="http://schemas.microsoft.com/office/drawing/2010/main">
+                <a14:hiddenEffects xmlns:a14="http://schemas.microsoft.com/office/drawing/2010/main" xmlns="">
                   <a:effectLst>
                     <a:outerShdw blurRad="63500" dist="38099" dir="2700000" algn="ctr" rotWithShape="0">
                       <a:schemeClr val="bg2">
@@ -17663,12 +17649,12 @@
             <a:effectLst/>
             <a:extLst>
               <a:ext uri="{909E8E84-426E-40dd-AFC4-6F175D3DCCD1}">
-                <a14:hiddenFill xmlns="" xmlns:a14="http://schemas.microsoft.com/office/drawing/2010/main">
+                <a14:hiddenFill xmlns:a14="http://schemas.microsoft.com/office/drawing/2010/main" xmlns="">
                   <a:noFill/>
                 </a14:hiddenFill>
               </a:ext>
               <a:ext uri="{AF507438-7753-43e0-B8FC-AC1667EBCBE1}">
-                <a14:hiddenEffects xmlns="" xmlns:a14="http://schemas.microsoft.com/office/drawing/2010/main">
+                <a14:hiddenEffects xmlns:a14="http://schemas.microsoft.com/office/drawing/2010/main" xmlns="">
                   <a:effectLst>
                     <a:outerShdw blurRad="63500" dist="38099" dir="2700000" algn="ctr" rotWithShape="0">
                       <a:schemeClr val="bg2">
@@ -17711,12 +17697,12 @@
             <a:effectLst/>
             <a:extLst>
               <a:ext uri="{909E8E84-426E-40dd-AFC4-6F175D3DCCD1}">
-                <a14:hiddenFill xmlns="" xmlns:a14="http://schemas.microsoft.com/office/drawing/2010/main">
+                <a14:hiddenFill xmlns:a14="http://schemas.microsoft.com/office/drawing/2010/main" xmlns="">
                   <a:noFill/>
                 </a14:hiddenFill>
               </a:ext>
               <a:ext uri="{AF507438-7753-43e0-B8FC-AC1667EBCBE1}">
-                <a14:hiddenEffects xmlns="" xmlns:a14="http://schemas.microsoft.com/office/drawing/2010/main">
+                <a14:hiddenEffects xmlns:a14="http://schemas.microsoft.com/office/drawing/2010/main" xmlns="">
                   <a:effectLst>
                     <a:outerShdw blurRad="63500" dist="38099" dir="2700000" algn="ctr" rotWithShape="0">
                       <a:schemeClr val="bg2">
@@ -17758,12 +17744,12 @@
           <a:effectLst/>
           <a:extLst>
             <a:ext uri="{909E8E84-426E-40dd-AFC4-6F175D3DCCD1}">
-              <a14:hiddenFill xmlns="" xmlns:a14="http://schemas.microsoft.com/office/drawing/2010/main">
+              <a14:hiddenFill xmlns:a14="http://schemas.microsoft.com/office/drawing/2010/main" xmlns="">
                 <a:noFill/>
               </a14:hiddenFill>
             </a:ext>
             <a:ext uri="{AF507438-7753-43e0-B8FC-AC1667EBCBE1}">
-              <a14:hiddenEffects xmlns="" xmlns:a14="http://schemas.microsoft.com/office/drawing/2010/main">
+              <a14:hiddenEffects xmlns:a14="http://schemas.microsoft.com/office/drawing/2010/main" xmlns="">
                 <a:effectLst>
                   <a:outerShdw blurRad="63500" dist="38099" dir="2700000" algn="ctr" rotWithShape="0">
                     <a:schemeClr val="bg2">
@@ -17805,14 +17791,14 @@
           <a:effectLst/>
           <a:extLst>
             <a:ext uri="{909E8E84-426E-40dd-AFC4-6F175D3DCCD1}">
-              <a14:hiddenFill xmlns="" xmlns:a14="http://schemas.microsoft.com/office/drawing/2010/main">
+              <a14:hiddenFill xmlns:a14="http://schemas.microsoft.com/office/drawing/2010/main" xmlns="">
                 <a:solidFill>
                   <a:schemeClr val="accent1"/>
                 </a:solidFill>
               </a14:hiddenFill>
             </a:ext>
             <a:ext uri="{AF507438-7753-43e0-B8FC-AC1667EBCBE1}">
-              <a14:hiddenEffects xmlns="" xmlns:a14="http://schemas.microsoft.com/office/drawing/2010/main">
+              <a14:hiddenEffects xmlns:a14="http://schemas.microsoft.com/office/drawing/2010/main" xmlns="">
                 <a:effectLst>
                   <a:outerShdw blurRad="63500" dist="38099" dir="2700000" algn="ctr" rotWithShape="0">
                     <a:schemeClr val="bg2">
@@ -17872,7 +17858,7 @@
           <a:effectLst/>
           <a:extLst>
             <a:ext uri="{AF507438-7753-43e0-B8FC-AC1667EBCBE1}">
-              <a14:hiddenEffects xmlns="" xmlns:a14="http://schemas.microsoft.com/office/drawing/2010/main">
+              <a14:hiddenEffects xmlns:a14="http://schemas.microsoft.com/office/drawing/2010/main" xmlns="">
                 <a:effectLst>
                   <a:outerShdw blurRad="63500" dist="38099" dir="2700000" algn="ctr" rotWithShape="0">
                     <a:schemeClr val="bg2">
@@ -17947,14 +17933,14 @@
             <a:effectLst/>
             <a:extLst>
               <a:ext uri="{909E8E84-426E-40dd-AFC4-6F175D3DCCD1}">
-                <a14:hiddenFill xmlns="" xmlns:a14="http://schemas.microsoft.com/office/drawing/2010/main">
+                <a14:hiddenFill xmlns:a14="http://schemas.microsoft.com/office/drawing/2010/main" xmlns="">
                   <a:solidFill>
                     <a:schemeClr val="accent1"/>
                   </a:solidFill>
                 </a14:hiddenFill>
               </a:ext>
               <a:ext uri="{AF507438-7753-43e0-B8FC-AC1667EBCBE1}">
-                <a14:hiddenEffects xmlns="" xmlns:a14="http://schemas.microsoft.com/office/drawing/2010/main">
+                <a14:hiddenEffects xmlns:a14="http://schemas.microsoft.com/office/drawing/2010/main" xmlns="">
                   <a:effectLst>
                     <a:outerShdw blurRad="63500" dist="38099" dir="2700000" algn="ctr" rotWithShape="0">
                       <a:schemeClr val="bg2">
@@ -18014,7 +18000,7 @@
             <a:effectLst/>
             <a:extLst>
               <a:ext uri="{AF507438-7753-43e0-B8FC-AC1667EBCBE1}">
-                <a14:hiddenEffects xmlns="" xmlns:a14="http://schemas.microsoft.com/office/drawing/2010/main">
+                <a14:hiddenEffects xmlns:a14="http://schemas.microsoft.com/office/drawing/2010/main" xmlns="">
                   <a:effectLst>
                     <a:outerShdw blurRad="63500" dist="38099" dir="2700000" algn="ctr" rotWithShape="0">
                       <a:schemeClr val="bg2">
@@ -18106,12 +18092,12 @@
               <a:effectLst/>
               <a:extLst>
                 <a:ext uri="{909E8E84-426E-40dd-AFC4-6F175D3DCCD1}">
-                  <a14:hiddenFill xmlns="" xmlns:a14="http://schemas.microsoft.com/office/drawing/2010/main">
+                  <a14:hiddenFill xmlns:a14="http://schemas.microsoft.com/office/drawing/2010/main" xmlns="">
                     <a:noFill/>
                   </a14:hiddenFill>
                 </a:ext>
                 <a:ext uri="{AF507438-7753-43e0-B8FC-AC1667EBCBE1}">
-                  <a14:hiddenEffects xmlns="" xmlns:a14="http://schemas.microsoft.com/office/drawing/2010/main">
+                  <a14:hiddenEffects xmlns:a14="http://schemas.microsoft.com/office/drawing/2010/main" xmlns="">
                     <a:effectLst>
                       <a:outerShdw blurRad="63500" dist="38099" dir="2700000" algn="ctr" rotWithShape="0">
                         <a:schemeClr val="bg2">
@@ -18166,12 +18152,12 @@
               <a:effectLst/>
               <a:extLst>
                 <a:ext uri="{909E8E84-426E-40dd-AFC4-6F175D3DCCD1}">
-                  <a14:hiddenFill xmlns="" xmlns:a14="http://schemas.microsoft.com/office/drawing/2010/main">
+                  <a14:hiddenFill xmlns:a14="http://schemas.microsoft.com/office/drawing/2010/main" xmlns="">
                     <a:noFill/>
                   </a14:hiddenFill>
                 </a:ext>
                 <a:ext uri="{AF507438-7753-43e0-B8FC-AC1667EBCBE1}">
-                  <a14:hiddenEffects xmlns="" xmlns:a14="http://schemas.microsoft.com/office/drawing/2010/main">
+                  <a14:hiddenEffects xmlns:a14="http://schemas.microsoft.com/office/drawing/2010/main" xmlns="">
                     <a:effectLst>
                       <a:outerShdw blurRad="63500" dist="38099" dir="2700000" algn="ctr" rotWithShape="0">
                         <a:schemeClr val="bg2">
@@ -18213,12 +18199,12 @@
               <a:effectLst/>
               <a:extLst>
                 <a:ext uri="{909E8E84-426E-40dd-AFC4-6F175D3DCCD1}">
-                  <a14:hiddenFill xmlns="" xmlns:a14="http://schemas.microsoft.com/office/drawing/2010/main">
+                  <a14:hiddenFill xmlns:a14="http://schemas.microsoft.com/office/drawing/2010/main" xmlns="">
                     <a:noFill/>
                   </a14:hiddenFill>
                 </a:ext>
                 <a:ext uri="{AF507438-7753-43e0-B8FC-AC1667EBCBE1}">
-                  <a14:hiddenEffects xmlns="" xmlns:a14="http://schemas.microsoft.com/office/drawing/2010/main">
+                  <a14:hiddenEffects xmlns:a14="http://schemas.microsoft.com/office/drawing/2010/main" xmlns="">
                     <a:effectLst>
                       <a:outerShdw blurRad="63500" dist="38099" dir="2700000" algn="ctr" rotWithShape="0">
                         <a:schemeClr val="bg2">
@@ -18261,12 +18247,12 @@
               <a:effectLst/>
               <a:extLst>
                 <a:ext uri="{909E8E84-426E-40dd-AFC4-6F175D3DCCD1}">
-                  <a14:hiddenFill xmlns="" xmlns:a14="http://schemas.microsoft.com/office/drawing/2010/main">
+                  <a14:hiddenFill xmlns:a14="http://schemas.microsoft.com/office/drawing/2010/main" xmlns="">
                     <a:noFill/>
                   </a14:hiddenFill>
                 </a:ext>
                 <a:ext uri="{AF507438-7753-43e0-B8FC-AC1667EBCBE1}">
-                  <a14:hiddenEffects xmlns="" xmlns:a14="http://schemas.microsoft.com/office/drawing/2010/main">
+                  <a14:hiddenEffects xmlns:a14="http://schemas.microsoft.com/office/drawing/2010/main" xmlns="">
                     <a:effectLst>
                       <a:outerShdw blurRad="63500" dist="38099" dir="2700000" algn="ctr" rotWithShape="0">
                         <a:schemeClr val="bg2">
@@ -18341,7 +18327,7 @@
                   <a:effectLst/>
                   <a:extLst>
                     <a:ext uri="{AF507438-7753-43e0-B8FC-AC1667EBCBE1}">
-                      <a14:hiddenEffects xmlns="" xmlns:a14="http://schemas.microsoft.com/office/drawing/2010/main">
+                      <a14:hiddenEffects xmlns:a14="http://schemas.microsoft.com/office/drawing/2010/main" xmlns="">
                         <a:effectLst>
                           <a:outerShdw blurRad="63500" dist="38099" dir="2700000" algn="ctr" rotWithShape="0">
                             <a:schemeClr val="bg2">
@@ -18400,14 +18386,14 @@
                   <a:effectLst/>
                   <a:extLst>
                     <a:ext uri="{909E8E84-426E-40dd-AFC4-6F175D3DCCD1}">
-                      <a14:hiddenFill xmlns="" xmlns:a14="http://schemas.microsoft.com/office/drawing/2010/main">
+                      <a14:hiddenFill xmlns:a14="http://schemas.microsoft.com/office/drawing/2010/main" xmlns="">
                         <a:solidFill>
                           <a:schemeClr val="accent1"/>
                         </a:solidFill>
                       </a14:hiddenFill>
                     </a:ext>
                     <a:ext uri="{91240B29-F687-4f45-9708-019B960494DF}">
-                      <a14:hiddenLine xmlns="" xmlns:a14="http://schemas.microsoft.com/office/drawing/2010/main" w="9525">
+                      <a14:hiddenLine xmlns:a14="http://schemas.microsoft.com/office/drawing/2010/main" xmlns="" w="9525">
                         <a:solidFill>
                           <a:schemeClr val="tx1"/>
                         </a:solidFill>
@@ -18417,7 +18403,7 @@
                       </a14:hiddenLine>
                     </a:ext>
                     <a:ext uri="{AF507438-7753-43e0-B8FC-AC1667EBCBE1}">
-                      <a14:hiddenEffects xmlns="" xmlns:a14="http://schemas.microsoft.com/office/drawing/2010/main">
+                      <a14:hiddenEffects xmlns:a14="http://schemas.microsoft.com/office/drawing/2010/main" xmlns="">
                         <a:effectLst>
                           <a:outerShdw blurRad="63500" dist="38099" dir="2700000" algn="ctr" rotWithShape="0">
                             <a:schemeClr val="bg2">
@@ -18497,7 +18483,7 @@
                   <a:effectLst/>
                   <a:extLst>
                     <a:ext uri="{AF507438-7753-43e0-B8FC-AC1667EBCBE1}">
-                      <a14:hiddenEffects xmlns="" xmlns:a14="http://schemas.microsoft.com/office/drawing/2010/main">
+                      <a14:hiddenEffects xmlns:a14="http://schemas.microsoft.com/office/drawing/2010/main" xmlns="">
                         <a:effectLst>
                           <a:outerShdw blurRad="63500" dist="38099" dir="2700000" algn="ctr" rotWithShape="0">
                             <a:schemeClr val="bg2">
@@ -18556,14 +18542,14 @@
                   <a:effectLst/>
                   <a:extLst>
                     <a:ext uri="{909E8E84-426E-40dd-AFC4-6F175D3DCCD1}">
-                      <a14:hiddenFill xmlns="" xmlns:a14="http://schemas.microsoft.com/office/drawing/2010/main">
+                      <a14:hiddenFill xmlns:a14="http://schemas.microsoft.com/office/drawing/2010/main" xmlns="">
                         <a:solidFill>
                           <a:schemeClr val="accent1"/>
                         </a:solidFill>
                       </a14:hiddenFill>
                     </a:ext>
                     <a:ext uri="{91240B29-F687-4f45-9708-019B960494DF}">
-                      <a14:hiddenLine xmlns="" xmlns:a14="http://schemas.microsoft.com/office/drawing/2010/main" w="9525">
+                      <a14:hiddenLine xmlns:a14="http://schemas.microsoft.com/office/drawing/2010/main" xmlns="" w="9525">
                         <a:solidFill>
                           <a:schemeClr val="tx1"/>
                         </a:solidFill>
@@ -18573,7 +18559,7 @@
                       </a14:hiddenLine>
                     </a:ext>
                     <a:ext uri="{AF507438-7753-43e0-B8FC-AC1667EBCBE1}">
-                      <a14:hiddenEffects xmlns="" xmlns:a14="http://schemas.microsoft.com/office/drawing/2010/main">
+                      <a14:hiddenEffects xmlns:a14="http://schemas.microsoft.com/office/drawing/2010/main" xmlns="">
                         <a:effectLst>
                           <a:outerShdw blurRad="63500" dist="38099" dir="2700000" algn="ctr" rotWithShape="0">
                             <a:schemeClr val="bg2">
@@ -18653,7 +18639,7 @@
                   <a:effectLst/>
                   <a:extLst>
                     <a:ext uri="{AF507438-7753-43e0-B8FC-AC1667EBCBE1}">
-                      <a14:hiddenEffects xmlns="" xmlns:a14="http://schemas.microsoft.com/office/drawing/2010/main">
+                      <a14:hiddenEffects xmlns:a14="http://schemas.microsoft.com/office/drawing/2010/main" xmlns="">
                         <a:effectLst>
                           <a:outerShdw blurRad="63500" dist="38099" dir="2700000" algn="ctr" rotWithShape="0">
                             <a:schemeClr val="bg2">
@@ -18712,14 +18698,14 @@
                   <a:effectLst/>
                   <a:extLst>
                     <a:ext uri="{909E8E84-426E-40dd-AFC4-6F175D3DCCD1}">
-                      <a14:hiddenFill xmlns="" xmlns:a14="http://schemas.microsoft.com/office/drawing/2010/main">
+                      <a14:hiddenFill xmlns:a14="http://schemas.microsoft.com/office/drawing/2010/main" xmlns="">
                         <a:solidFill>
                           <a:schemeClr val="accent1"/>
                         </a:solidFill>
                       </a14:hiddenFill>
                     </a:ext>
                     <a:ext uri="{91240B29-F687-4f45-9708-019B960494DF}">
-                      <a14:hiddenLine xmlns="" xmlns:a14="http://schemas.microsoft.com/office/drawing/2010/main" w="9525">
+                      <a14:hiddenLine xmlns:a14="http://schemas.microsoft.com/office/drawing/2010/main" xmlns="" w="9525">
                         <a:solidFill>
                           <a:schemeClr val="tx1"/>
                         </a:solidFill>
@@ -18729,7 +18715,7 @@
                       </a14:hiddenLine>
                     </a:ext>
                     <a:ext uri="{AF507438-7753-43e0-B8FC-AC1667EBCBE1}">
-                      <a14:hiddenEffects xmlns="" xmlns:a14="http://schemas.microsoft.com/office/drawing/2010/main">
+                      <a14:hiddenEffects xmlns:a14="http://schemas.microsoft.com/office/drawing/2010/main" xmlns="">
                         <a:effectLst>
                           <a:outerShdw blurRad="63500" dist="38099" dir="2700000" algn="ctr" rotWithShape="0">
                             <a:schemeClr val="bg2">
@@ -18802,14 +18788,14 @@
                   <a:effectLst/>
                   <a:extLst>
                     <a:ext uri="{909E8E84-426E-40dd-AFC4-6F175D3DCCD1}">
-                      <a14:hiddenFill xmlns="" xmlns:a14="http://schemas.microsoft.com/office/drawing/2010/main">
+                      <a14:hiddenFill xmlns:a14="http://schemas.microsoft.com/office/drawing/2010/main" xmlns="">
                         <a:solidFill>
                           <a:schemeClr val="accent1"/>
                         </a:solidFill>
                       </a14:hiddenFill>
                     </a:ext>
                     <a:ext uri="{91240B29-F687-4f45-9708-019B960494DF}">
-                      <a14:hiddenLine xmlns="" xmlns:a14="http://schemas.microsoft.com/office/drawing/2010/main" w="9525">
+                      <a14:hiddenLine xmlns:a14="http://schemas.microsoft.com/office/drawing/2010/main" xmlns="" w="9525">
                         <a:solidFill>
                           <a:schemeClr val="tx1"/>
                         </a:solidFill>
@@ -18819,7 +18805,7 @@
                       </a14:hiddenLine>
                     </a:ext>
                     <a:ext uri="{AF507438-7753-43e0-B8FC-AC1667EBCBE1}">
-                      <a14:hiddenEffects xmlns="" xmlns:a14="http://schemas.microsoft.com/office/drawing/2010/main">
+                      <a14:hiddenEffects xmlns:a14="http://schemas.microsoft.com/office/drawing/2010/main" xmlns="">
                         <a:effectLst>
                           <a:outerShdw blurRad="63500" dist="38099" dir="2700000" algn="ctr" rotWithShape="0">
                             <a:schemeClr val="bg2">
@@ -18882,7 +18868,7 @@
                   <a:effectLst/>
                   <a:extLst>
                     <a:ext uri="{AF507438-7753-43e0-B8FC-AC1667EBCBE1}">
-                      <a14:hiddenEffects xmlns="" xmlns:a14="http://schemas.microsoft.com/office/drawing/2010/main">
+                      <a14:hiddenEffects xmlns:a14="http://schemas.microsoft.com/office/drawing/2010/main" xmlns="">
                         <a:effectLst>
                           <a:outerShdw blurRad="63500" dist="38099" dir="2700000" algn="ctr" rotWithShape="0">
                             <a:schemeClr val="bg2">
@@ -18958,14 +18944,14 @@
                   <a:effectLst/>
                   <a:extLst>
                     <a:ext uri="{909E8E84-426E-40dd-AFC4-6F175D3DCCD1}">
-                      <a14:hiddenFill xmlns="" xmlns:a14="http://schemas.microsoft.com/office/drawing/2010/main">
+                      <a14:hiddenFill xmlns:a14="http://schemas.microsoft.com/office/drawing/2010/main" xmlns="">
                         <a:solidFill>
                           <a:schemeClr val="accent1"/>
                         </a:solidFill>
                       </a14:hiddenFill>
                     </a:ext>
                     <a:ext uri="{91240B29-F687-4f45-9708-019B960494DF}">
-                      <a14:hiddenLine xmlns="" xmlns:a14="http://schemas.microsoft.com/office/drawing/2010/main" w="9525">
+                      <a14:hiddenLine xmlns:a14="http://schemas.microsoft.com/office/drawing/2010/main" xmlns="" w="9525">
                         <a:solidFill>
                           <a:schemeClr val="tx1"/>
                         </a:solidFill>
@@ -18975,7 +18961,7 @@
                       </a14:hiddenLine>
                     </a:ext>
                     <a:ext uri="{AF507438-7753-43e0-B8FC-AC1667EBCBE1}">
-                      <a14:hiddenEffects xmlns="" xmlns:a14="http://schemas.microsoft.com/office/drawing/2010/main">
+                      <a14:hiddenEffects xmlns:a14="http://schemas.microsoft.com/office/drawing/2010/main" xmlns="">
                         <a:effectLst>
                           <a:outerShdw blurRad="63500" dist="38099" dir="2700000" algn="ctr" rotWithShape="0">
                             <a:schemeClr val="bg2">
@@ -19038,7 +19024,7 @@
                   <a:effectLst/>
                   <a:extLst>
                     <a:ext uri="{AF507438-7753-43e0-B8FC-AC1667EBCBE1}">
-                      <a14:hiddenEffects xmlns="" xmlns:a14="http://schemas.microsoft.com/office/drawing/2010/main">
+                      <a14:hiddenEffects xmlns:a14="http://schemas.microsoft.com/office/drawing/2010/main" xmlns="">
                         <a:effectLst>
                           <a:outerShdw blurRad="63500" dist="38099" dir="2700000" algn="ctr" rotWithShape="0">
                             <a:schemeClr val="bg2">
@@ -19108,12 +19094,12 @@
               <a:effectLst/>
               <a:extLst>
                 <a:ext uri="{909E8E84-426E-40dd-AFC4-6F175D3DCCD1}">
-                  <a14:hiddenFill xmlns="" xmlns:a14="http://schemas.microsoft.com/office/drawing/2010/main">
+                  <a14:hiddenFill xmlns:a14="http://schemas.microsoft.com/office/drawing/2010/main" xmlns="">
                     <a:noFill/>
                   </a14:hiddenFill>
                 </a:ext>
                 <a:ext uri="{AF507438-7753-43e0-B8FC-AC1667EBCBE1}">
-                  <a14:hiddenEffects xmlns="" xmlns:a14="http://schemas.microsoft.com/office/drawing/2010/main">
+                  <a14:hiddenEffects xmlns:a14="http://schemas.microsoft.com/office/drawing/2010/main" xmlns="">
                     <a:effectLst>
                       <a:outerShdw blurRad="63500" dist="38099" dir="2700000" algn="ctr" rotWithShape="0">
                         <a:schemeClr val="bg2">
@@ -19158,12 +19144,12 @@
               <a:effectLst/>
               <a:extLst>
                 <a:ext uri="{909E8E84-426E-40dd-AFC4-6F175D3DCCD1}">
-                  <a14:hiddenFill xmlns="" xmlns:a14="http://schemas.microsoft.com/office/drawing/2010/main">
+                  <a14:hiddenFill xmlns:a14="http://schemas.microsoft.com/office/drawing/2010/main" xmlns="">
                     <a:noFill/>
                   </a14:hiddenFill>
                 </a:ext>
                 <a:ext uri="{AF507438-7753-43e0-B8FC-AC1667EBCBE1}">
-                  <a14:hiddenEffects xmlns="" xmlns:a14="http://schemas.microsoft.com/office/drawing/2010/main">
+                  <a14:hiddenEffects xmlns:a14="http://schemas.microsoft.com/office/drawing/2010/main" xmlns="">
                     <a:effectLst>
                       <a:outerShdw blurRad="63500" dist="38099" dir="2700000" algn="ctr" rotWithShape="0">
                         <a:schemeClr val="bg2">
@@ -19206,12 +19192,12 @@
               <a:effectLst/>
               <a:extLst>
                 <a:ext uri="{909E8E84-426E-40dd-AFC4-6F175D3DCCD1}">
-                  <a14:hiddenFill xmlns="" xmlns:a14="http://schemas.microsoft.com/office/drawing/2010/main">
+                  <a14:hiddenFill xmlns:a14="http://schemas.microsoft.com/office/drawing/2010/main" xmlns="">
                     <a:noFill/>
                   </a14:hiddenFill>
                 </a:ext>
                 <a:ext uri="{AF507438-7753-43e0-B8FC-AC1667EBCBE1}">
-                  <a14:hiddenEffects xmlns="" xmlns:a14="http://schemas.microsoft.com/office/drawing/2010/main">
+                  <a14:hiddenEffects xmlns:a14="http://schemas.microsoft.com/office/drawing/2010/main" xmlns="">
                     <a:effectLst>
                       <a:outerShdw blurRad="63500" dist="38099" dir="2700000" algn="ctr" rotWithShape="0">
                         <a:schemeClr val="bg2">
@@ -19250,7 +19236,7 @@
             <a:effectLst/>
             <a:extLst>
               <a:ext uri="{91240B29-F687-4f45-9708-019B960494DF}">
-                <a14:hiddenLine xmlns="" xmlns:a14="http://schemas.microsoft.com/office/drawing/2010/main" w="38100">
+                <a14:hiddenLine xmlns:a14="http://schemas.microsoft.com/office/drawing/2010/main" xmlns="" w="38100">
                   <a:solidFill>
                     <a:schemeClr val="tx1"/>
                   </a:solidFill>
@@ -19260,7 +19246,7 @@
                 </a14:hiddenLine>
               </a:ext>
               <a:ext uri="{AF507438-7753-43e0-B8FC-AC1667EBCBE1}">
-                <a14:hiddenEffects xmlns="" xmlns:a14="http://schemas.microsoft.com/office/drawing/2010/main">
+                <a14:hiddenEffects xmlns:a14="http://schemas.microsoft.com/office/drawing/2010/main" xmlns="">
                   <a:effectLst>
                     <a:outerShdw blurRad="63500" dist="38099" dir="2700000" algn="ctr" rotWithShape="0">
                       <a:schemeClr val="bg2">
@@ -19329,7 +19315,7 @@
             <a:effectLst/>
             <a:extLst>
               <a:ext uri="{AF507438-7753-43e0-B8FC-AC1667EBCBE1}">
-                <a14:hiddenEffects xmlns="" xmlns:a14="http://schemas.microsoft.com/office/drawing/2010/main">
+                <a14:hiddenEffects xmlns:a14="http://schemas.microsoft.com/office/drawing/2010/main" xmlns="">
                   <a:effectLst>
                     <a:outerShdw blurRad="63500" dist="38099" dir="2700000" algn="ctr" rotWithShape="0">
                       <a:schemeClr val="bg2">
@@ -19415,12 +19401,12 @@
               <a:effectLst/>
               <a:extLst>
                 <a:ext uri="{909E8E84-426E-40dd-AFC4-6F175D3DCCD1}">
-                  <a14:hiddenFill xmlns="" xmlns:a14="http://schemas.microsoft.com/office/drawing/2010/main">
+                  <a14:hiddenFill xmlns:a14="http://schemas.microsoft.com/office/drawing/2010/main" xmlns="">
                     <a:noFill/>
                   </a14:hiddenFill>
                 </a:ext>
                 <a:ext uri="{AF507438-7753-43e0-B8FC-AC1667EBCBE1}">
-                  <a14:hiddenEffects xmlns="" xmlns:a14="http://schemas.microsoft.com/office/drawing/2010/main">
+                  <a14:hiddenEffects xmlns:a14="http://schemas.microsoft.com/office/drawing/2010/main" xmlns="">
                     <a:effectLst>
                       <a:outerShdw blurRad="63500" dist="38099" dir="2700000" algn="ctr" rotWithShape="0">
                         <a:schemeClr val="bg2">
@@ -19475,12 +19461,12 @@
               <a:effectLst/>
               <a:extLst>
                 <a:ext uri="{909E8E84-426E-40dd-AFC4-6F175D3DCCD1}">
-                  <a14:hiddenFill xmlns="" xmlns:a14="http://schemas.microsoft.com/office/drawing/2010/main">
+                  <a14:hiddenFill xmlns:a14="http://schemas.microsoft.com/office/drawing/2010/main" xmlns="">
                     <a:noFill/>
                   </a14:hiddenFill>
                 </a:ext>
                 <a:ext uri="{AF507438-7753-43e0-B8FC-AC1667EBCBE1}">
-                  <a14:hiddenEffects xmlns="" xmlns:a14="http://schemas.microsoft.com/office/drawing/2010/main">
+                  <a14:hiddenEffects xmlns:a14="http://schemas.microsoft.com/office/drawing/2010/main" xmlns="">
                     <a:effectLst>
                       <a:outerShdw blurRad="63500" dist="38099" dir="2700000" algn="ctr" rotWithShape="0">
                         <a:schemeClr val="bg2">
@@ -19522,12 +19508,12 @@
               <a:effectLst/>
               <a:extLst>
                 <a:ext uri="{909E8E84-426E-40dd-AFC4-6F175D3DCCD1}">
-                  <a14:hiddenFill xmlns="" xmlns:a14="http://schemas.microsoft.com/office/drawing/2010/main">
+                  <a14:hiddenFill xmlns:a14="http://schemas.microsoft.com/office/drawing/2010/main" xmlns="">
                     <a:noFill/>
                   </a14:hiddenFill>
                 </a:ext>
                 <a:ext uri="{AF507438-7753-43e0-B8FC-AC1667EBCBE1}">
-                  <a14:hiddenEffects xmlns="" xmlns:a14="http://schemas.microsoft.com/office/drawing/2010/main">
+                  <a14:hiddenEffects xmlns:a14="http://schemas.microsoft.com/office/drawing/2010/main" xmlns="">
                     <a:effectLst>
                       <a:outerShdw blurRad="63500" dist="38099" dir="2700000" algn="ctr" rotWithShape="0">
                         <a:schemeClr val="bg2">
@@ -19570,12 +19556,12 @@
               <a:effectLst/>
               <a:extLst>
                 <a:ext uri="{909E8E84-426E-40dd-AFC4-6F175D3DCCD1}">
-                  <a14:hiddenFill xmlns="" xmlns:a14="http://schemas.microsoft.com/office/drawing/2010/main">
+                  <a14:hiddenFill xmlns:a14="http://schemas.microsoft.com/office/drawing/2010/main" xmlns="">
                     <a:noFill/>
                   </a14:hiddenFill>
                 </a:ext>
                 <a:ext uri="{AF507438-7753-43e0-B8FC-AC1667EBCBE1}">
-                  <a14:hiddenEffects xmlns="" xmlns:a14="http://schemas.microsoft.com/office/drawing/2010/main">
+                  <a14:hiddenEffects xmlns:a14="http://schemas.microsoft.com/office/drawing/2010/main" xmlns="">
                     <a:effectLst>
                       <a:outerShdw blurRad="63500" dist="38099" dir="2700000" algn="ctr" rotWithShape="0">
                         <a:schemeClr val="bg2">
@@ -19650,7 +19636,7 @@
                   <a:effectLst/>
                   <a:extLst>
                     <a:ext uri="{AF507438-7753-43e0-B8FC-AC1667EBCBE1}">
-                      <a14:hiddenEffects xmlns="" xmlns:a14="http://schemas.microsoft.com/office/drawing/2010/main">
+                      <a14:hiddenEffects xmlns:a14="http://schemas.microsoft.com/office/drawing/2010/main" xmlns="">
                         <a:effectLst>
                           <a:outerShdw blurRad="63500" dist="38099" dir="2700000" algn="ctr" rotWithShape="0">
                             <a:schemeClr val="bg2">
@@ -19709,14 +19695,14 @@
                   <a:effectLst/>
                   <a:extLst>
                     <a:ext uri="{909E8E84-426E-40dd-AFC4-6F175D3DCCD1}">
-                      <a14:hiddenFill xmlns="" xmlns:a14="http://schemas.microsoft.com/office/drawing/2010/main">
+                      <a14:hiddenFill xmlns:a14="http://schemas.microsoft.com/office/drawing/2010/main" xmlns="">
                         <a:solidFill>
                           <a:schemeClr val="accent1"/>
                         </a:solidFill>
                       </a14:hiddenFill>
                     </a:ext>
                     <a:ext uri="{91240B29-F687-4f45-9708-019B960494DF}">
-                      <a14:hiddenLine xmlns="" xmlns:a14="http://schemas.microsoft.com/office/drawing/2010/main" w="9525">
+                      <a14:hiddenLine xmlns:a14="http://schemas.microsoft.com/office/drawing/2010/main" xmlns="" w="9525">
                         <a:solidFill>
                           <a:schemeClr val="tx1"/>
                         </a:solidFill>
@@ -19726,7 +19712,7 @@
                       </a14:hiddenLine>
                     </a:ext>
                     <a:ext uri="{AF507438-7753-43e0-B8FC-AC1667EBCBE1}">
-                      <a14:hiddenEffects xmlns="" xmlns:a14="http://schemas.microsoft.com/office/drawing/2010/main">
+                      <a14:hiddenEffects xmlns:a14="http://schemas.microsoft.com/office/drawing/2010/main" xmlns="">
                         <a:effectLst>
                           <a:outerShdw blurRad="63500" dist="38099" dir="2700000" algn="ctr" rotWithShape="0">
                             <a:schemeClr val="bg2">
@@ -19806,7 +19792,7 @@
                   <a:effectLst/>
                   <a:extLst>
                     <a:ext uri="{AF507438-7753-43e0-B8FC-AC1667EBCBE1}">
-                      <a14:hiddenEffects xmlns="" xmlns:a14="http://schemas.microsoft.com/office/drawing/2010/main">
+                      <a14:hiddenEffects xmlns:a14="http://schemas.microsoft.com/office/drawing/2010/main" xmlns="">
                         <a:effectLst>
                           <a:outerShdw blurRad="63500" dist="38099" dir="2700000" algn="ctr" rotWithShape="0">
                             <a:schemeClr val="bg2">
@@ -19865,14 +19851,14 @@
                   <a:effectLst/>
                   <a:extLst>
                     <a:ext uri="{909E8E84-426E-40dd-AFC4-6F175D3DCCD1}">
-                      <a14:hiddenFill xmlns="" xmlns:a14="http://schemas.microsoft.com/office/drawing/2010/main">
+                      <a14:hiddenFill xmlns:a14="http://schemas.microsoft.com/office/drawing/2010/main" xmlns="">
                         <a:solidFill>
                           <a:schemeClr val="accent1"/>
                         </a:solidFill>
                       </a14:hiddenFill>
                     </a:ext>
                     <a:ext uri="{91240B29-F687-4f45-9708-019B960494DF}">
-                      <a14:hiddenLine xmlns="" xmlns:a14="http://schemas.microsoft.com/office/drawing/2010/main" w="9525">
+                      <a14:hiddenLine xmlns:a14="http://schemas.microsoft.com/office/drawing/2010/main" xmlns="" w="9525">
                         <a:solidFill>
                           <a:schemeClr val="tx1"/>
                         </a:solidFill>
@@ -19882,7 +19868,7 @@
                       </a14:hiddenLine>
                     </a:ext>
                     <a:ext uri="{AF507438-7753-43e0-B8FC-AC1667EBCBE1}">
-                      <a14:hiddenEffects xmlns="" xmlns:a14="http://schemas.microsoft.com/office/drawing/2010/main">
+                      <a14:hiddenEffects xmlns:a14="http://schemas.microsoft.com/office/drawing/2010/main" xmlns="">
                         <a:effectLst>
                           <a:outerShdw blurRad="63500" dist="38099" dir="2700000" algn="ctr" rotWithShape="0">
                             <a:schemeClr val="bg2">
@@ -19962,7 +19948,7 @@
                   <a:effectLst/>
                   <a:extLst>
                     <a:ext uri="{AF507438-7753-43e0-B8FC-AC1667EBCBE1}">
-                      <a14:hiddenEffects xmlns="" xmlns:a14="http://schemas.microsoft.com/office/drawing/2010/main">
+                      <a14:hiddenEffects xmlns:a14="http://schemas.microsoft.com/office/drawing/2010/main" xmlns="">
                         <a:effectLst>
                           <a:outerShdw blurRad="63500" dist="38099" dir="2700000" algn="ctr" rotWithShape="0">
                             <a:schemeClr val="bg2">
@@ -20021,14 +20007,14 @@
                   <a:effectLst/>
                   <a:extLst>
                     <a:ext uri="{909E8E84-426E-40dd-AFC4-6F175D3DCCD1}">
-                      <a14:hiddenFill xmlns="" xmlns:a14="http://schemas.microsoft.com/office/drawing/2010/main">
+                      <a14:hiddenFill xmlns:a14="http://schemas.microsoft.com/office/drawing/2010/main" xmlns="">
                         <a:solidFill>
                           <a:schemeClr val="accent1"/>
                         </a:solidFill>
                       </a14:hiddenFill>
                     </a:ext>
                     <a:ext uri="{91240B29-F687-4f45-9708-019B960494DF}">
-                      <a14:hiddenLine xmlns="" xmlns:a14="http://schemas.microsoft.com/office/drawing/2010/main" w="9525">
+                      <a14:hiddenLine xmlns:a14="http://schemas.microsoft.com/office/drawing/2010/main" xmlns="" w="9525">
                         <a:solidFill>
                           <a:schemeClr val="tx1"/>
                         </a:solidFill>
@@ -20038,7 +20024,7 @@
                       </a14:hiddenLine>
                     </a:ext>
                     <a:ext uri="{AF507438-7753-43e0-B8FC-AC1667EBCBE1}">
-                      <a14:hiddenEffects xmlns="" xmlns:a14="http://schemas.microsoft.com/office/drawing/2010/main">
+                      <a14:hiddenEffects xmlns:a14="http://schemas.microsoft.com/office/drawing/2010/main" xmlns="">
                         <a:effectLst>
                           <a:outerShdw blurRad="63500" dist="38099" dir="2700000" algn="ctr" rotWithShape="0">
                             <a:schemeClr val="bg2">
@@ -20111,14 +20097,14 @@
                   <a:effectLst/>
                   <a:extLst>
                     <a:ext uri="{909E8E84-426E-40dd-AFC4-6F175D3DCCD1}">
-                      <a14:hiddenFill xmlns="" xmlns:a14="http://schemas.microsoft.com/office/drawing/2010/main">
+                      <a14:hiddenFill xmlns:a14="http://schemas.microsoft.com/office/drawing/2010/main" xmlns="">
                         <a:solidFill>
                           <a:schemeClr val="accent1"/>
                         </a:solidFill>
                       </a14:hiddenFill>
                     </a:ext>
                     <a:ext uri="{91240B29-F687-4f45-9708-019B960494DF}">
-                      <a14:hiddenLine xmlns="" xmlns:a14="http://schemas.microsoft.com/office/drawing/2010/main" w="9525">
+                      <a14:hiddenLine xmlns:a14="http://schemas.microsoft.com/office/drawing/2010/main" xmlns="" w="9525">
                         <a:solidFill>
                           <a:schemeClr val="tx1"/>
                         </a:solidFill>
@@ -20128,7 +20114,7 @@
                       </a14:hiddenLine>
                     </a:ext>
                     <a:ext uri="{AF507438-7753-43e0-B8FC-AC1667EBCBE1}">
-                      <a14:hiddenEffects xmlns="" xmlns:a14="http://schemas.microsoft.com/office/drawing/2010/main">
+                      <a14:hiddenEffects xmlns:a14="http://schemas.microsoft.com/office/drawing/2010/main" xmlns="">
                         <a:effectLst>
                           <a:outerShdw blurRad="63500" dist="38099" dir="2700000" algn="ctr" rotWithShape="0">
                             <a:schemeClr val="bg2">
@@ -20191,7 +20177,7 @@
                   <a:effectLst/>
                   <a:extLst>
                     <a:ext uri="{AF507438-7753-43e0-B8FC-AC1667EBCBE1}">
-                      <a14:hiddenEffects xmlns="" xmlns:a14="http://schemas.microsoft.com/office/drawing/2010/main">
+                      <a14:hiddenEffects xmlns:a14="http://schemas.microsoft.com/office/drawing/2010/main" xmlns="">
                         <a:effectLst>
                           <a:outerShdw blurRad="63500" dist="38099" dir="2700000" algn="ctr" rotWithShape="0">
                             <a:schemeClr val="bg2">
@@ -20267,14 +20253,14 @@
                   <a:effectLst/>
                   <a:extLst>
                     <a:ext uri="{909E8E84-426E-40dd-AFC4-6F175D3DCCD1}">
-                      <a14:hiddenFill xmlns="" xmlns:a14="http://schemas.microsoft.com/office/drawing/2010/main">
+                      <a14:hiddenFill xmlns:a14="http://schemas.microsoft.com/office/drawing/2010/main" xmlns="">
                         <a:solidFill>
                           <a:schemeClr val="accent1"/>
                         </a:solidFill>
                       </a14:hiddenFill>
                     </a:ext>
                     <a:ext uri="{91240B29-F687-4f45-9708-019B960494DF}">
-                      <a14:hiddenLine xmlns="" xmlns:a14="http://schemas.microsoft.com/office/drawing/2010/main" w="9525">
+                      <a14:hiddenLine xmlns:a14="http://schemas.microsoft.com/office/drawing/2010/main" xmlns="" w="9525">
                         <a:solidFill>
                           <a:schemeClr val="tx1"/>
                         </a:solidFill>
@@ -20284,7 +20270,7 @@
                       </a14:hiddenLine>
                     </a:ext>
                     <a:ext uri="{AF507438-7753-43e0-B8FC-AC1667EBCBE1}">
-                      <a14:hiddenEffects xmlns="" xmlns:a14="http://schemas.microsoft.com/office/drawing/2010/main">
+                      <a14:hiddenEffects xmlns:a14="http://schemas.microsoft.com/office/drawing/2010/main" xmlns="">
                         <a:effectLst>
                           <a:outerShdw blurRad="63500" dist="38099" dir="2700000" algn="ctr" rotWithShape="0">
                             <a:schemeClr val="bg2">
@@ -20347,7 +20333,7 @@
                   <a:effectLst/>
                   <a:extLst>
                     <a:ext uri="{AF507438-7753-43e0-B8FC-AC1667EBCBE1}">
-                      <a14:hiddenEffects xmlns="" xmlns:a14="http://schemas.microsoft.com/office/drawing/2010/main">
+                      <a14:hiddenEffects xmlns:a14="http://schemas.microsoft.com/office/drawing/2010/main" xmlns="">
                         <a:effectLst>
                           <a:outerShdw blurRad="63500" dist="38099" dir="2700000" algn="ctr" rotWithShape="0">
                             <a:schemeClr val="bg2">
@@ -20417,12 +20403,12 @@
               <a:effectLst/>
               <a:extLst>
                 <a:ext uri="{909E8E84-426E-40dd-AFC4-6F175D3DCCD1}">
-                  <a14:hiddenFill xmlns="" xmlns:a14="http://schemas.microsoft.com/office/drawing/2010/main">
+                  <a14:hiddenFill xmlns:a14="http://schemas.microsoft.com/office/drawing/2010/main" xmlns="">
                     <a:noFill/>
                   </a14:hiddenFill>
                 </a:ext>
                 <a:ext uri="{AF507438-7753-43e0-B8FC-AC1667EBCBE1}">
-                  <a14:hiddenEffects xmlns="" xmlns:a14="http://schemas.microsoft.com/office/drawing/2010/main">
+                  <a14:hiddenEffects xmlns:a14="http://schemas.microsoft.com/office/drawing/2010/main" xmlns="">
                     <a:effectLst>
                       <a:outerShdw blurRad="63500" dist="38099" dir="2700000" algn="ctr" rotWithShape="0">
                         <a:schemeClr val="bg2">
@@ -20467,12 +20453,12 @@
               <a:effectLst/>
               <a:extLst>
                 <a:ext uri="{909E8E84-426E-40dd-AFC4-6F175D3DCCD1}">
-                  <a14:hiddenFill xmlns="" xmlns:a14="http://schemas.microsoft.com/office/drawing/2010/main">
+                  <a14:hiddenFill xmlns:a14="http://schemas.microsoft.com/office/drawing/2010/main" xmlns="">
                     <a:noFill/>
                   </a14:hiddenFill>
                 </a:ext>
                 <a:ext uri="{AF507438-7753-43e0-B8FC-AC1667EBCBE1}">
-                  <a14:hiddenEffects xmlns="" xmlns:a14="http://schemas.microsoft.com/office/drawing/2010/main">
+                  <a14:hiddenEffects xmlns:a14="http://schemas.microsoft.com/office/drawing/2010/main" xmlns="">
                     <a:effectLst>
                       <a:outerShdw blurRad="63500" dist="38099" dir="2700000" algn="ctr" rotWithShape="0">
                         <a:schemeClr val="bg2">
@@ -20515,12 +20501,12 @@
               <a:effectLst/>
               <a:extLst>
                 <a:ext uri="{909E8E84-426E-40dd-AFC4-6F175D3DCCD1}">
-                  <a14:hiddenFill xmlns="" xmlns:a14="http://schemas.microsoft.com/office/drawing/2010/main">
+                  <a14:hiddenFill xmlns:a14="http://schemas.microsoft.com/office/drawing/2010/main" xmlns="">
                     <a:noFill/>
                   </a14:hiddenFill>
                 </a:ext>
                 <a:ext uri="{AF507438-7753-43e0-B8FC-AC1667EBCBE1}">
-                  <a14:hiddenEffects xmlns="" xmlns:a14="http://schemas.microsoft.com/office/drawing/2010/main">
+                  <a14:hiddenEffects xmlns:a14="http://schemas.microsoft.com/office/drawing/2010/main" xmlns="">
                     <a:effectLst>
                       <a:outerShdw blurRad="63500" dist="38099" dir="2700000" algn="ctr" rotWithShape="0">
                         <a:schemeClr val="bg2">
@@ -20559,7 +20545,7 @@
             <a:effectLst/>
             <a:extLst>
               <a:ext uri="{91240B29-F687-4f45-9708-019B960494DF}">
-                <a14:hiddenLine xmlns="" xmlns:a14="http://schemas.microsoft.com/office/drawing/2010/main" w="38100">
+                <a14:hiddenLine xmlns:a14="http://schemas.microsoft.com/office/drawing/2010/main" xmlns="" w="38100">
                   <a:solidFill>
                     <a:schemeClr val="tx1"/>
                   </a:solidFill>
@@ -20569,7 +20555,7 @@
                 </a14:hiddenLine>
               </a:ext>
               <a:ext uri="{AF507438-7753-43e0-B8FC-AC1667EBCBE1}">
-                <a14:hiddenEffects xmlns="" xmlns:a14="http://schemas.microsoft.com/office/drawing/2010/main">
+                <a14:hiddenEffects xmlns:a14="http://schemas.microsoft.com/office/drawing/2010/main" xmlns="">
                   <a:effectLst>
                     <a:outerShdw blurRad="63500" dist="38099" dir="2700000" algn="ctr" rotWithShape="0">
                       <a:schemeClr val="bg2">
@@ -20651,7 +20637,7 @@
             <a:effectLst/>
             <a:extLst>
               <a:ext uri="{AF507438-7753-43e0-B8FC-AC1667EBCBE1}">
-                <a14:hiddenEffects xmlns="" xmlns:a14="http://schemas.microsoft.com/office/drawing/2010/main">
+                <a14:hiddenEffects xmlns:a14="http://schemas.microsoft.com/office/drawing/2010/main" xmlns="">
                   <a:effectLst>
                     <a:outerShdw blurRad="63500" dist="38099" dir="2700000" algn="ctr" rotWithShape="0">
                       <a:schemeClr val="bg2">
@@ -20722,12 +20708,12 @@
             <a:effectLst/>
             <a:extLst>
               <a:ext uri="{909E8E84-426E-40dd-AFC4-6F175D3DCCD1}">
-                <a14:hiddenFill xmlns="" xmlns:a14="http://schemas.microsoft.com/office/drawing/2010/main">
+                <a14:hiddenFill xmlns:a14="http://schemas.microsoft.com/office/drawing/2010/main" xmlns="">
                   <a:noFill/>
                 </a14:hiddenFill>
               </a:ext>
               <a:ext uri="{AF507438-7753-43e0-B8FC-AC1667EBCBE1}">
-                <a14:hiddenEffects xmlns="" xmlns:a14="http://schemas.microsoft.com/office/drawing/2010/main">
+                <a14:hiddenEffects xmlns:a14="http://schemas.microsoft.com/office/drawing/2010/main" xmlns="">
                   <a:effectLst>
                     <a:outerShdw blurRad="63500" dist="38099" dir="2700000" algn="ctr" rotWithShape="0">
                       <a:schemeClr val="bg2">
@@ -20781,12 +20767,12 @@
             <a:effectLst/>
             <a:extLst>
               <a:ext uri="{909E8E84-426E-40dd-AFC4-6F175D3DCCD1}">
-                <a14:hiddenFill xmlns="" xmlns:a14="http://schemas.microsoft.com/office/drawing/2010/main">
+                <a14:hiddenFill xmlns:a14="http://schemas.microsoft.com/office/drawing/2010/main" xmlns="">
                   <a:noFill/>
                 </a14:hiddenFill>
               </a:ext>
               <a:ext uri="{AF507438-7753-43e0-B8FC-AC1667EBCBE1}">
-                <a14:hiddenEffects xmlns="" xmlns:a14="http://schemas.microsoft.com/office/drawing/2010/main">
+                <a14:hiddenEffects xmlns:a14="http://schemas.microsoft.com/office/drawing/2010/main" xmlns="">
                   <a:effectLst>
                     <a:outerShdw blurRad="63500" dist="38099" dir="2700000" algn="ctr" rotWithShape="0">
                       <a:schemeClr val="bg2">
@@ -20840,12 +20826,12 @@
             <a:effectLst/>
             <a:extLst>
               <a:ext uri="{909E8E84-426E-40dd-AFC4-6F175D3DCCD1}">
-                <a14:hiddenFill xmlns="" xmlns:a14="http://schemas.microsoft.com/office/drawing/2010/main">
+                <a14:hiddenFill xmlns:a14="http://schemas.microsoft.com/office/drawing/2010/main" xmlns="">
                   <a:noFill/>
                 </a14:hiddenFill>
               </a:ext>
               <a:ext uri="{AF507438-7753-43e0-B8FC-AC1667EBCBE1}">
-                <a14:hiddenEffects xmlns="" xmlns:a14="http://schemas.microsoft.com/office/drawing/2010/main">
+                <a14:hiddenEffects xmlns:a14="http://schemas.microsoft.com/office/drawing/2010/main" xmlns="">
                   <a:effectLst>
                     <a:outerShdw blurRad="63500" dist="38099" dir="2700000" algn="ctr" rotWithShape="0">
                       <a:schemeClr val="bg2">
@@ -20899,12 +20885,12 @@
             <a:effectLst/>
             <a:extLst>
               <a:ext uri="{909E8E84-426E-40dd-AFC4-6F175D3DCCD1}">
-                <a14:hiddenFill xmlns="" xmlns:a14="http://schemas.microsoft.com/office/drawing/2010/main">
+                <a14:hiddenFill xmlns:a14="http://schemas.microsoft.com/office/drawing/2010/main" xmlns="">
                   <a:noFill/>
                 </a14:hiddenFill>
               </a:ext>
               <a:ext uri="{AF507438-7753-43e0-B8FC-AC1667EBCBE1}">
-                <a14:hiddenEffects xmlns="" xmlns:a14="http://schemas.microsoft.com/office/drawing/2010/main">
+                <a14:hiddenEffects xmlns:a14="http://schemas.microsoft.com/office/drawing/2010/main" xmlns="">
                   <a:effectLst>
                     <a:outerShdw blurRad="63500" dist="38099" dir="2700000" algn="ctr" rotWithShape="0">
                       <a:schemeClr val="bg2">
@@ -21530,12 +21516,12 @@
           <a:effectLst/>
           <a:extLst>
             <a:ext uri="{909E8E84-426E-40dd-AFC4-6F175D3DCCD1}">
-              <a14:hiddenFill xmlns="" xmlns:a14="http://schemas.microsoft.com/office/drawing/2010/main">
+              <a14:hiddenFill xmlns:a14="http://schemas.microsoft.com/office/drawing/2010/main" xmlns="">
                 <a:noFill/>
               </a14:hiddenFill>
             </a:ext>
             <a:ext uri="{AF507438-7753-43e0-B8FC-AC1667EBCBE1}">
-              <a14:hiddenEffects xmlns="" xmlns:a14="http://schemas.microsoft.com/office/drawing/2010/main">
+              <a14:hiddenEffects xmlns:a14="http://schemas.microsoft.com/office/drawing/2010/main" xmlns="">
                 <a:effectLst>
                   <a:outerShdw blurRad="63500" dist="38099" dir="2700000" algn="ctr" rotWithShape="0">
                     <a:schemeClr val="bg2">
@@ -21592,12 +21578,12 @@
             <a:effectLst/>
             <a:extLst>
               <a:ext uri="{909E8E84-426E-40dd-AFC4-6F175D3DCCD1}">
-                <a14:hiddenFill xmlns="" xmlns:a14="http://schemas.microsoft.com/office/drawing/2010/main">
+                <a14:hiddenFill xmlns:a14="http://schemas.microsoft.com/office/drawing/2010/main" xmlns="">
                   <a:noFill/>
                 </a14:hiddenFill>
               </a:ext>
               <a:ext uri="{AF507438-7753-43e0-B8FC-AC1667EBCBE1}">
-                <a14:hiddenEffects xmlns="" xmlns:a14="http://schemas.microsoft.com/office/drawing/2010/main">
+                <a14:hiddenEffects xmlns:a14="http://schemas.microsoft.com/office/drawing/2010/main" xmlns="">
                   <a:effectLst>
                     <a:outerShdw blurRad="63500" dist="38099" dir="2700000" algn="ctr" rotWithShape="0">
                       <a:schemeClr val="bg2">
@@ -21652,12 +21638,12 @@
             <a:effectLst/>
             <a:extLst>
               <a:ext uri="{909E8E84-426E-40dd-AFC4-6F175D3DCCD1}">
-                <a14:hiddenFill xmlns="" xmlns:a14="http://schemas.microsoft.com/office/drawing/2010/main">
+                <a14:hiddenFill xmlns:a14="http://schemas.microsoft.com/office/drawing/2010/main" xmlns="">
                   <a:noFill/>
                 </a14:hiddenFill>
               </a:ext>
               <a:ext uri="{AF507438-7753-43e0-B8FC-AC1667EBCBE1}">
-                <a14:hiddenEffects xmlns="" xmlns:a14="http://schemas.microsoft.com/office/drawing/2010/main">
+                <a14:hiddenEffects xmlns:a14="http://schemas.microsoft.com/office/drawing/2010/main" xmlns="">
                   <a:effectLst>
                     <a:outerShdw blurRad="63500" dist="38099" dir="2700000" algn="ctr" rotWithShape="0">
                       <a:schemeClr val="bg2">
@@ -21699,12 +21685,12 @@
             <a:effectLst/>
             <a:extLst>
               <a:ext uri="{909E8E84-426E-40dd-AFC4-6F175D3DCCD1}">
-                <a14:hiddenFill xmlns="" xmlns:a14="http://schemas.microsoft.com/office/drawing/2010/main">
+                <a14:hiddenFill xmlns:a14="http://schemas.microsoft.com/office/drawing/2010/main" xmlns="">
                   <a:noFill/>
                 </a14:hiddenFill>
               </a:ext>
               <a:ext uri="{AF507438-7753-43e0-B8FC-AC1667EBCBE1}">
-                <a14:hiddenEffects xmlns="" xmlns:a14="http://schemas.microsoft.com/office/drawing/2010/main">
+                <a14:hiddenEffects xmlns:a14="http://schemas.microsoft.com/office/drawing/2010/main" xmlns="">
                   <a:effectLst>
                     <a:outerShdw blurRad="63500" dist="38099" dir="2700000" algn="ctr" rotWithShape="0">
                       <a:schemeClr val="bg2">
@@ -21747,12 +21733,12 @@
             <a:effectLst/>
             <a:extLst>
               <a:ext uri="{909E8E84-426E-40dd-AFC4-6F175D3DCCD1}">
-                <a14:hiddenFill xmlns="" xmlns:a14="http://schemas.microsoft.com/office/drawing/2010/main">
+                <a14:hiddenFill xmlns:a14="http://schemas.microsoft.com/office/drawing/2010/main" xmlns="">
                   <a:noFill/>
                 </a14:hiddenFill>
               </a:ext>
               <a:ext uri="{AF507438-7753-43e0-B8FC-AC1667EBCBE1}">
-                <a14:hiddenEffects xmlns="" xmlns:a14="http://schemas.microsoft.com/office/drawing/2010/main">
+                <a14:hiddenEffects xmlns:a14="http://schemas.microsoft.com/office/drawing/2010/main" xmlns="">
                   <a:effectLst>
                     <a:outerShdw blurRad="63500" dist="38099" dir="2700000" algn="ctr" rotWithShape="0">
                       <a:schemeClr val="bg2">
@@ -21827,7 +21813,7 @@
                 <a:effectLst/>
                 <a:extLst>
                   <a:ext uri="{AF507438-7753-43e0-B8FC-AC1667EBCBE1}">
-                    <a14:hiddenEffects xmlns="" xmlns:a14="http://schemas.microsoft.com/office/drawing/2010/main">
+                    <a14:hiddenEffects xmlns:a14="http://schemas.microsoft.com/office/drawing/2010/main" xmlns="">
                       <a:effectLst>
                         <a:outerShdw blurRad="63500" dist="38099" dir="2700000" algn="ctr" rotWithShape="0">
                           <a:schemeClr val="bg2">
@@ -21886,14 +21872,14 @@
                 <a:effectLst/>
                 <a:extLst>
                   <a:ext uri="{909E8E84-426E-40dd-AFC4-6F175D3DCCD1}">
-                    <a14:hiddenFill xmlns="" xmlns:a14="http://schemas.microsoft.com/office/drawing/2010/main">
+                    <a14:hiddenFill xmlns:a14="http://schemas.microsoft.com/office/drawing/2010/main" xmlns="">
                       <a:solidFill>
                         <a:schemeClr val="accent1"/>
                       </a:solidFill>
                     </a14:hiddenFill>
                   </a:ext>
                   <a:ext uri="{91240B29-F687-4f45-9708-019B960494DF}">
-                    <a14:hiddenLine xmlns="" xmlns:a14="http://schemas.microsoft.com/office/drawing/2010/main" w="9525">
+                    <a14:hiddenLine xmlns:a14="http://schemas.microsoft.com/office/drawing/2010/main" xmlns="" w="9525">
                       <a:solidFill>
                         <a:schemeClr val="tx1"/>
                       </a:solidFill>
@@ -21903,7 +21889,7 @@
                     </a14:hiddenLine>
                   </a:ext>
                   <a:ext uri="{AF507438-7753-43e0-B8FC-AC1667EBCBE1}">
-                    <a14:hiddenEffects xmlns="" xmlns:a14="http://schemas.microsoft.com/office/drawing/2010/main">
+                    <a14:hiddenEffects xmlns:a14="http://schemas.microsoft.com/office/drawing/2010/main" xmlns="">
                       <a:effectLst>
                         <a:outerShdw blurRad="63500" dist="38099" dir="2700000" algn="ctr" rotWithShape="0">
                           <a:schemeClr val="bg2">
@@ -21983,7 +21969,7 @@
                 <a:effectLst/>
                 <a:extLst>
                   <a:ext uri="{AF507438-7753-43e0-B8FC-AC1667EBCBE1}">
-                    <a14:hiddenEffects xmlns="" xmlns:a14="http://schemas.microsoft.com/office/drawing/2010/main">
+                    <a14:hiddenEffects xmlns:a14="http://schemas.microsoft.com/office/drawing/2010/main" xmlns="">
                       <a:effectLst>
                         <a:outerShdw blurRad="63500" dist="38099" dir="2700000" algn="ctr" rotWithShape="0">
                           <a:schemeClr val="bg2">
@@ -22042,14 +22028,14 @@
                 <a:effectLst/>
                 <a:extLst>
                   <a:ext uri="{909E8E84-426E-40dd-AFC4-6F175D3DCCD1}">
-                    <a14:hiddenFill xmlns="" xmlns:a14="http://schemas.microsoft.com/office/drawing/2010/main">
+                    <a14:hiddenFill xmlns:a14="http://schemas.microsoft.com/office/drawing/2010/main" xmlns="">
                       <a:solidFill>
                         <a:schemeClr val="accent1"/>
                       </a:solidFill>
                     </a14:hiddenFill>
                   </a:ext>
                   <a:ext uri="{91240B29-F687-4f45-9708-019B960494DF}">
-                    <a14:hiddenLine xmlns="" xmlns:a14="http://schemas.microsoft.com/office/drawing/2010/main" w="9525">
+                    <a14:hiddenLine xmlns:a14="http://schemas.microsoft.com/office/drawing/2010/main" xmlns="" w="9525">
                       <a:solidFill>
                         <a:schemeClr val="tx1"/>
                       </a:solidFill>
@@ -22059,7 +22045,7 @@
                     </a14:hiddenLine>
                   </a:ext>
                   <a:ext uri="{AF507438-7753-43e0-B8FC-AC1667EBCBE1}">
-                    <a14:hiddenEffects xmlns="" xmlns:a14="http://schemas.microsoft.com/office/drawing/2010/main">
+                    <a14:hiddenEffects xmlns:a14="http://schemas.microsoft.com/office/drawing/2010/main" xmlns="">
                       <a:effectLst>
                         <a:outerShdw blurRad="63500" dist="38099" dir="2700000" algn="ctr" rotWithShape="0">
                           <a:schemeClr val="bg2">
@@ -22139,7 +22125,7 @@
                 <a:effectLst/>
                 <a:extLst>
                   <a:ext uri="{AF507438-7753-43e0-B8FC-AC1667EBCBE1}">
-                    <a14:hiddenEffects xmlns="" xmlns:a14="http://schemas.microsoft.com/office/drawing/2010/main">
+                    <a14:hiddenEffects xmlns:a14="http://schemas.microsoft.com/office/drawing/2010/main" xmlns="">
                       <a:effectLst>
                         <a:outerShdw blurRad="63500" dist="38099" dir="2700000" algn="ctr" rotWithShape="0">
                           <a:schemeClr val="bg2">
@@ -22198,14 +22184,14 @@
                 <a:effectLst/>
                 <a:extLst>
                   <a:ext uri="{909E8E84-426E-40dd-AFC4-6F175D3DCCD1}">
-                    <a14:hiddenFill xmlns="" xmlns:a14="http://schemas.microsoft.com/office/drawing/2010/main">
+                    <a14:hiddenFill xmlns:a14="http://schemas.microsoft.com/office/drawing/2010/main" xmlns="">
                       <a:solidFill>
                         <a:schemeClr val="accent1"/>
                       </a:solidFill>
                     </a14:hiddenFill>
                   </a:ext>
                   <a:ext uri="{91240B29-F687-4f45-9708-019B960494DF}">
-                    <a14:hiddenLine xmlns="" xmlns:a14="http://schemas.microsoft.com/office/drawing/2010/main" w="9525">
+                    <a14:hiddenLine xmlns:a14="http://schemas.microsoft.com/office/drawing/2010/main" xmlns="" w="9525">
                       <a:solidFill>
                         <a:schemeClr val="tx1"/>
                       </a:solidFill>
@@ -22215,7 +22201,7 @@
                     </a14:hiddenLine>
                   </a:ext>
                   <a:ext uri="{AF507438-7753-43e0-B8FC-AC1667EBCBE1}">
-                    <a14:hiddenEffects xmlns="" xmlns:a14="http://schemas.microsoft.com/office/drawing/2010/main">
+                    <a14:hiddenEffects xmlns:a14="http://schemas.microsoft.com/office/drawing/2010/main" xmlns="">
                       <a:effectLst>
                         <a:outerShdw blurRad="63500" dist="38099" dir="2700000" algn="ctr" rotWithShape="0">
                           <a:schemeClr val="bg2">
@@ -22288,14 +22274,14 @@
                 <a:effectLst/>
                 <a:extLst>
                   <a:ext uri="{909E8E84-426E-40dd-AFC4-6F175D3DCCD1}">
-                    <a14:hiddenFill xmlns="" xmlns:a14="http://schemas.microsoft.com/office/drawing/2010/main">
+                    <a14:hiddenFill xmlns:a14="http://schemas.microsoft.com/office/drawing/2010/main" xmlns="">
                       <a:solidFill>
                         <a:schemeClr val="accent1"/>
                       </a:solidFill>
                     </a14:hiddenFill>
                   </a:ext>
                   <a:ext uri="{91240B29-F687-4f45-9708-019B960494DF}">
-                    <a14:hiddenLine xmlns="" xmlns:a14="http://schemas.microsoft.com/office/drawing/2010/main" w="9525">
+                    <a14:hiddenLine xmlns:a14="http://schemas.microsoft.com/office/drawing/2010/main" xmlns="" w="9525">
                       <a:solidFill>
                         <a:schemeClr val="tx1"/>
                       </a:solidFill>
@@ -22305,7 +22291,7 @@
                     </a14:hiddenLine>
                   </a:ext>
                   <a:ext uri="{AF507438-7753-43e0-B8FC-AC1667EBCBE1}">
-                    <a14:hiddenEffects xmlns="" xmlns:a14="http://schemas.microsoft.com/office/drawing/2010/main">
+                    <a14:hiddenEffects xmlns:a14="http://schemas.microsoft.com/office/drawing/2010/main" xmlns="">
                       <a:effectLst>
                         <a:outerShdw blurRad="63500" dist="38099" dir="2700000" algn="ctr" rotWithShape="0">
                           <a:schemeClr val="bg2">
@@ -22368,7 +22354,7 @@
                 <a:effectLst/>
                 <a:extLst>
                   <a:ext uri="{AF507438-7753-43e0-B8FC-AC1667EBCBE1}">
-                    <a14:hiddenEffects xmlns="" xmlns:a14="http://schemas.microsoft.com/office/drawing/2010/main">
+                    <a14:hiddenEffects xmlns:a14="http://schemas.microsoft.com/office/drawing/2010/main" xmlns="">
                       <a:effectLst>
                         <a:outerShdw blurRad="63500" dist="38099" dir="2700000" algn="ctr" rotWithShape="0">
                           <a:schemeClr val="bg2">
@@ -22444,14 +22430,14 @@
                 <a:effectLst/>
                 <a:extLst>
                   <a:ext uri="{909E8E84-426E-40dd-AFC4-6F175D3DCCD1}">
-                    <a14:hiddenFill xmlns="" xmlns:a14="http://schemas.microsoft.com/office/drawing/2010/main">
+                    <a14:hiddenFill xmlns:a14="http://schemas.microsoft.com/office/drawing/2010/main" xmlns="">
                       <a:solidFill>
                         <a:schemeClr val="accent1"/>
                       </a:solidFill>
                     </a14:hiddenFill>
                   </a:ext>
                   <a:ext uri="{91240B29-F687-4f45-9708-019B960494DF}">
-                    <a14:hiddenLine xmlns="" xmlns:a14="http://schemas.microsoft.com/office/drawing/2010/main" w="9525">
+                    <a14:hiddenLine xmlns:a14="http://schemas.microsoft.com/office/drawing/2010/main" xmlns="" w="9525">
                       <a:solidFill>
                         <a:schemeClr val="tx1"/>
                       </a:solidFill>
@@ -22461,7 +22447,7 @@
                     </a14:hiddenLine>
                   </a:ext>
                   <a:ext uri="{AF507438-7753-43e0-B8FC-AC1667EBCBE1}">
-                    <a14:hiddenEffects xmlns="" xmlns:a14="http://schemas.microsoft.com/office/drawing/2010/main">
+                    <a14:hiddenEffects xmlns:a14="http://schemas.microsoft.com/office/drawing/2010/main" xmlns="">
                       <a:effectLst>
                         <a:outerShdw blurRad="63500" dist="38099" dir="2700000" algn="ctr" rotWithShape="0">
                           <a:schemeClr val="bg2">
@@ -22524,7 +22510,7 @@
                 <a:effectLst/>
                 <a:extLst>
                   <a:ext uri="{AF507438-7753-43e0-B8FC-AC1667EBCBE1}">
-                    <a14:hiddenEffects xmlns="" xmlns:a14="http://schemas.microsoft.com/office/drawing/2010/main">
+                    <a14:hiddenEffects xmlns:a14="http://schemas.microsoft.com/office/drawing/2010/main" xmlns="">
                       <a:effectLst>
                         <a:outerShdw blurRad="63500" dist="38099" dir="2700000" algn="ctr" rotWithShape="0">
                           <a:schemeClr val="bg2">
@@ -22594,12 +22580,12 @@
             <a:effectLst/>
             <a:extLst>
               <a:ext uri="{909E8E84-426E-40dd-AFC4-6F175D3DCCD1}">
-                <a14:hiddenFill xmlns="" xmlns:a14="http://schemas.microsoft.com/office/drawing/2010/main">
+                <a14:hiddenFill xmlns:a14="http://schemas.microsoft.com/office/drawing/2010/main" xmlns="">
                   <a:noFill/>
                 </a14:hiddenFill>
               </a:ext>
               <a:ext uri="{AF507438-7753-43e0-B8FC-AC1667EBCBE1}">
-                <a14:hiddenEffects xmlns="" xmlns:a14="http://schemas.microsoft.com/office/drawing/2010/main">
+                <a14:hiddenEffects xmlns:a14="http://schemas.microsoft.com/office/drawing/2010/main" xmlns="">
                   <a:effectLst>
                     <a:outerShdw blurRad="63500" dist="38099" dir="2700000" algn="ctr" rotWithShape="0">
                       <a:schemeClr val="bg2">
@@ -22644,12 +22630,12 @@
             <a:effectLst/>
             <a:extLst>
               <a:ext uri="{909E8E84-426E-40dd-AFC4-6F175D3DCCD1}">
-                <a14:hiddenFill xmlns="" xmlns:a14="http://schemas.microsoft.com/office/drawing/2010/main">
+                <a14:hiddenFill xmlns:a14="http://schemas.microsoft.com/office/drawing/2010/main" xmlns="">
                   <a:noFill/>
                 </a14:hiddenFill>
               </a:ext>
               <a:ext uri="{AF507438-7753-43e0-B8FC-AC1667EBCBE1}">
-                <a14:hiddenEffects xmlns="" xmlns:a14="http://schemas.microsoft.com/office/drawing/2010/main">
+                <a14:hiddenEffects xmlns:a14="http://schemas.microsoft.com/office/drawing/2010/main" xmlns="">
                   <a:effectLst>
                     <a:outerShdw blurRad="63500" dist="38099" dir="2700000" algn="ctr" rotWithShape="0">
                       <a:schemeClr val="bg2">
@@ -22692,12 +22678,12 @@
             <a:effectLst/>
             <a:extLst>
               <a:ext uri="{909E8E84-426E-40dd-AFC4-6F175D3DCCD1}">
-                <a14:hiddenFill xmlns="" xmlns:a14="http://schemas.microsoft.com/office/drawing/2010/main">
+                <a14:hiddenFill xmlns:a14="http://schemas.microsoft.com/office/drawing/2010/main" xmlns="">
                   <a:noFill/>
                 </a14:hiddenFill>
               </a:ext>
               <a:ext uri="{AF507438-7753-43e0-B8FC-AC1667EBCBE1}">
-                <a14:hiddenEffects xmlns="" xmlns:a14="http://schemas.microsoft.com/office/drawing/2010/main">
+                <a14:hiddenEffects xmlns:a14="http://schemas.microsoft.com/office/drawing/2010/main" xmlns="">
                   <a:effectLst>
                     <a:outerShdw blurRad="63500" dist="38099" dir="2700000" algn="ctr" rotWithShape="0">
                       <a:schemeClr val="bg2">
@@ -22741,7 +22727,7 @@
           <a:effectLst/>
           <a:extLst>
             <a:ext uri="{AF507438-7753-43e0-B8FC-AC1667EBCBE1}">
-              <a14:hiddenEffects xmlns="" xmlns:a14="http://schemas.microsoft.com/office/drawing/2010/main">
+              <a14:hiddenEffects xmlns:a14="http://schemas.microsoft.com/office/drawing/2010/main" xmlns="">
                 <a:effectLst>
                   <a:outerShdw blurRad="63500" dist="38099" dir="2700000" algn="ctr" rotWithShape="0">
                     <a:schemeClr val="bg2">
@@ -22807,7 +22793,7 @@
           <a:effectLst/>
           <a:extLst>
             <a:ext uri="{AF507438-7753-43e0-B8FC-AC1667EBCBE1}">
-              <a14:hiddenEffects xmlns="" xmlns:a14="http://schemas.microsoft.com/office/drawing/2010/main">
+              <a14:hiddenEffects xmlns:a14="http://schemas.microsoft.com/office/drawing/2010/main" xmlns="">
                 <a:effectLst>
                   <a:outerShdw blurRad="63500" dist="38099" dir="2700000" algn="ctr" rotWithShape="0">
                     <a:schemeClr val="bg2">
@@ -22873,7 +22859,7 @@
           <a:effectLst/>
           <a:extLst>
             <a:ext uri="{AF507438-7753-43e0-B8FC-AC1667EBCBE1}">
-              <a14:hiddenEffects xmlns="" xmlns:a14="http://schemas.microsoft.com/office/drawing/2010/main">
+              <a14:hiddenEffects xmlns:a14="http://schemas.microsoft.com/office/drawing/2010/main" xmlns="">
                 <a:effectLst>
                   <a:outerShdw blurRad="63500" dist="38099" dir="2700000" algn="ctr" rotWithShape="0">
                     <a:schemeClr val="bg2">
@@ -22939,7 +22925,7 @@
           <a:effectLst/>
           <a:extLst>
             <a:ext uri="{AF507438-7753-43e0-B8FC-AC1667EBCBE1}">
-              <a14:hiddenEffects xmlns="" xmlns:a14="http://schemas.microsoft.com/office/drawing/2010/main">
+              <a14:hiddenEffects xmlns:a14="http://schemas.microsoft.com/office/drawing/2010/main" xmlns="">
                 <a:effectLst>
                   <a:outerShdw blurRad="63500" dist="38099" dir="2700000" algn="ctr" rotWithShape="0">
                     <a:schemeClr val="bg2">
@@ -23005,7 +22991,7 @@
           <a:effectLst/>
           <a:extLst>
             <a:ext uri="{AF507438-7753-43e0-B8FC-AC1667EBCBE1}">
-              <a14:hiddenEffects xmlns="" xmlns:a14="http://schemas.microsoft.com/office/drawing/2010/main">
+              <a14:hiddenEffects xmlns:a14="http://schemas.microsoft.com/office/drawing/2010/main" xmlns="">
                 <a:effectLst>
                   <a:outerShdw blurRad="63500" dist="38099" dir="2700000" algn="ctr" rotWithShape="0">
                     <a:schemeClr val="bg2">
@@ -23071,7 +23057,7 @@
           <a:effectLst/>
           <a:extLst>
             <a:ext uri="{AF507438-7753-43e0-B8FC-AC1667EBCBE1}">
-              <a14:hiddenEffects xmlns="" xmlns:a14="http://schemas.microsoft.com/office/drawing/2010/main">
+              <a14:hiddenEffects xmlns:a14="http://schemas.microsoft.com/office/drawing/2010/main" xmlns="">
                 <a:effectLst>
                   <a:outerShdw blurRad="63500" dist="38099" dir="2700000" algn="ctr" rotWithShape="0">
                     <a:schemeClr val="bg2">
@@ -23134,7 +23120,7 @@
           <a:effectLst/>
           <a:extLst>
             <a:ext uri="{AF507438-7753-43e0-B8FC-AC1667EBCBE1}">
-              <a14:hiddenEffects xmlns="" xmlns:a14="http://schemas.microsoft.com/office/drawing/2010/main">
+              <a14:hiddenEffects xmlns:a14="http://schemas.microsoft.com/office/drawing/2010/main" xmlns="">
                 <a:effectLst>
                   <a:outerShdw blurRad="63500" dist="38099" dir="2700000" algn="ctr" rotWithShape="0">
                     <a:schemeClr val="bg2">
@@ -23200,7 +23186,7 @@
           <a:effectLst/>
           <a:extLst>
             <a:ext uri="{AF507438-7753-43e0-B8FC-AC1667EBCBE1}">
-              <a14:hiddenEffects xmlns="" xmlns:a14="http://schemas.microsoft.com/office/drawing/2010/main">
+              <a14:hiddenEffects xmlns:a14="http://schemas.microsoft.com/office/drawing/2010/main" xmlns="">
                 <a:effectLst>
                   <a:outerShdw blurRad="63500" dist="38099" dir="2700000" algn="ctr" rotWithShape="0">
                     <a:schemeClr val="bg2">
@@ -23266,7 +23252,7 @@
           <a:effectLst/>
           <a:extLst>
             <a:ext uri="{AF507438-7753-43e0-B8FC-AC1667EBCBE1}">
-              <a14:hiddenEffects xmlns="" xmlns:a14="http://schemas.microsoft.com/office/drawing/2010/main">
+              <a14:hiddenEffects xmlns:a14="http://schemas.microsoft.com/office/drawing/2010/main" xmlns="">
                 <a:effectLst>
                   <a:outerShdw blurRad="63500" dist="38099" dir="2700000" algn="ctr" rotWithShape="0">
                     <a:schemeClr val="bg2">
@@ -23327,14 +23313,14 @@
           <a:effectLst/>
           <a:extLst>
             <a:ext uri="{909E8E84-426E-40dd-AFC4-6F175D3DCCD1}">
-              <a14:hiddenFill xmlns="" xmlns:a14="http://schemas.microsoft.com/office/drawing/2010/main">
+              <a14:hiddenFill xmlns:a14="http://schemas.microsoft.com/office/drawing/2010/main" xmlns="">
                 <a:solidFill>
                   <a:schemeClr val="accent1"/>
                 </a:solidFill>
               </a14:hiddenFill>
             </a:ext>
             <a:ext uri="{AF507438-7753-43e0-B8FC-AC1667EBCBE1}">
-              <a14:hiddenEffects xmlns="" xmlns:a14="http://schemas.microsoft.com/office/drawing/2010/main">
+              <a14:hiddenEffects xmlns:a14="http://schemas.microsoft.com/office/drawing/2010/main" xmlns="">
                 <a:effectLst>
                   <a:outerShdw blurRad="63500" dist="38099" dir="2700000" algn="ctr" rotWithShape="0">
                     <a:schemeClr val="bg2">
@@ -23389,7 +23375,7 @@
           <a:effectLst/>
           <a:extLst>
             <a:ext uri="{AF507438-7753-43e0-B8FC-AC1667EBCBE1}">
-              <a14:hiddenEffects xmlns="" xmlns:a14="http://schemas.microsoft.com/office/drawing/2010/main">
+              <a14:hiddenEffects xmlns:a14="http://schemas.microsoft.com/office/drawing/2010/main" xmlns="">
                 <a:effectLst>
                   <a:outerShdw blurRad="63500" dist="38099" dir="2700000" algn="ctr" rotWithShape="0">
                     <a:schemeClr val="bg2">
@@ -23455,7 +23441,7 @@
           <a:effectLst/>
           <a:extLst>
             <a:ext uri="{AF507438-7753-43e0-B8FC-AC1667EBCBE1}">
-              <a14:hiddenEffects xmlns="" xmlns:a14="http://schemas.microsoft.com/office/drawing/2010/main">
+              <a14:hiddenEffects xmlns:a14="http://schemas.microsoft.com/office/drawing/2010/main" xmlns="">
                 <a:effectLst>
                   <a:outerShdw blurRad="63500" dist="38099" dir="2700000" algn="ctr" rotWithShape="0">
                     <a:schemeClr val="bg2">
@@ -23521,7 +23507,7 @@
           <a:effectLst/>
           <a:extLst>
             <a:ext uri="{AF507438-7753-43e0-B8FC-AC1667EBCBE1}">
-              <a14:hiddenEffects xmlns="" xmlns:a14="http://schemas.microsoft.com/office/drawing/2010/main">
+              <a14:hiddenEffects xmlns:a14="http://schemas.microsoft.com/office/drawing/2010/main" xmlns="">
                 <a:effectLst>
                   <a:outerShdw blurRad="63500" dist="38099" dir="2700000" algn="ctr" rotWithShape="0">
                     <a:schemeClr val="bg2">
@@ -23587,7 +23573,7 @@
           <a:effectLst/>
           <a:extLst>
             <a:ext uri="{AF507438-7753-43e0-B8FC-AC1667EBCBE1}">
-              <a14:hiddenEffects xmlns="" xmlns:a14="http://schemas.microsoft.com/office/drawing/2010/main">
+              <a14:hiddenEffects xmlns:a14="http://schemas.microsoft.com/office/drawing/2010/main" xmlns="">
                 <a:effectLst>
                   <a:outerShdw blurRad="63500" dist="38099" dir="2700000" algn="ctr" rotWithShape="0">
                     <a:schemeClr val="bg2">
@@ -23648,14 +23634,14 @@
           <a:effectLst/>
           <a:extLst>
             <a:ext uri="{909E8E84-426E-40dd-AFC4-6F175D3DCCD1}">
-              <a14:hiddenFill xmlns="" xmlns:a14="http://schemas.microsoft.com/office/drawing/2010/main">
+              <a14:hiddenFill xmlns:a14="http://schemas.microsoft.com/office/drawing/2010/main" xmlns="">
                 <a:solidFill>
                   <a:schemeClr val="accent1"/>
                 </a:solidFill>
               </a14:hiddenFill>
             </a:ext>
             <a:ext uri="{AF507438-7753-43e0-B8FC-AC1667EBCBE1}">
-              <a14:hiddenEffects xmlns="" xmlns:a14="http://schemas.microsoft.com/office/drawing/2010/main">
+              <a14:hiddenEffects xmlns:a14="http://schemas.microsoft.com/office/drawing/2010/main" xmlns="">
                 <a:effectLst>
                   <a:outerShdw blurRad="63500" dist="38099" dir="2700000" algn="ctr" rotWithShape="0">
                     <a:schemeClr val="bg2">

</xml_diff>